<commit_message>
'lvds_test' has been updated so that 'stimulus' includes 'lvds1'.
</commit_message>
<xml_diff>
--- a/0090_ber/rtl/schematic/lvds1.pptx
+++ b/0090_ber/rtl/schematic/lvds1.pptx
@@ -2,7 +2,7 @@
 <file path=ppt/presentation.xml><?xml version="1.0" encoding="utf-8"?>
 <p:presentation xmlns:a="http://schemas.openxmlformats.org/drawingml/2006/main" xmlns:r="http://schemas.openxmlformats.org/officeDocument/2006/relationships" xmlns:p="http://schemas.openxmlformats.org/presentationml/2006/main" saveSubsetFonts="1">
   <p:sldMasterIdLst>
-    <p:sldMasterId id="2147484513" r:id="rId1"/>
+    <p:sldMasterId id="2147484537" r:id="rId1"/>
   </p:sldMasterIdLst>
   <p:notesMasterIdLst>
     <p:notesMasterId r:id="rId3"/>
@@ -10,7 +10,7 @@
   <p:sldIdLst>
     <p:sldId id="262" r:id="rId2"/>
   </p:sldIdLst>
-  <p:sldSz cx="25603200" cy="18288000"/>
+  <p:sldSz cx="27432000" cy="18288000"/>
   <p:notesSz cx="6797675" cy="9926638"/>
   <p:defaultTextStyle>
     <a:defPPr>
@@ -197,7 +197,7 @@
           <a:p>
             <a:fld id="{B9E5BF02-4A65-43B2-AA51-912306618617}" type="datetimeFigureOut">
               <a:rPr lang="en-US" smtClean="0"/>
-              <a:t>10/12/2017</a:t>
+              <a:t>10/25/2017</a:t>
             </a:fld>
             <a:endParaRPr lang="en-US"/>
           </a:p>
@@ -215,8 +215,8 @@
         </p:nvSpPr>
         <p:spPr>
           <a:xfrm>
-            <a:off x="1054100" y="1241425"/>
-            <a:ext cx="4689475" cy="3349625"/>
+            <a:off x="885825" y="1241425"/>
+            <a:ext cx="5026025" cy="3349625"/>
           </a:xfrm>
           <a:prstGeom prst="rect">
             <a:avLst/>
@@ -494,8 +494,8 @@
         </p:nvSpPr>
         <p:spPr>
           <a:xfrm>
-            <a:off x="1054100" y="1241425"/>
-            <a:ext cx="4689475" cy="3349625"/>
+            <a:off x="885825" y="1241425"/>
+            <a:ext cx="5026025" cy="3349625"/>
           </a:xfrm>
         </p:spPr>
       </p:sp>
@@ -583,8 +583,8 @@
         </p:nvSpPr>
         <p:spPr>
           <a:xfrm>
-            <a:off x="1920240" y="2992968"/>
-            <a:ext cx="21762720" cy="6366933"/>
+            <a:off x="2057400" y="2992968"/>
+            <a:ext cx="23317200" cy="6366933"/>
           </a:xfrm>
         </p:spPr>
         <p:txBody>
@@ -615,8 +615,8 @@
         </p:nvSpPr>
         <p:spPr>
           <a:xfrm>
-            <a:off x="3200400" y="9605435"/>
-            <a:ext cx="19202400" cy="4415365"/>
+            <a:off x="3429000" y="9605435"/>
+            <a:ext cx="20574000" cy="4415365"/>
           </a:xfrm>
         </p:spPr>
         <p:txBody>
@@ -685,7 +685,7 @@
           <a:p>
             <a:fld id="{F8F920B2-3E99-4C9D-9450-62A3DEC5476B}" type="datetimeFigureOut">
               <a:rPr lang="en-US" smtClean="0"/>
-              <a:t>10/12/2017</a:t>
+              <a:t>10/25/2017</a:t>
             </a:fld>
             <a:endParaRPr lang="en-US"/>
           </a:p>
@@ -736,7 +736,7 @@
     </p:spTree>
     <p:extLst>
       <p:ext uri="{BB962C8B-B14F-4D97-AF65-F5344CB8AC3E}">
-        <p14:creationId xmlns:p14="http://schemas.microsoft.com/office/powerpoint/2010/main" val="3145381081"/>
+        <p14:creationId xmlns:p14="http://schemas.microsoft.com/office/powerpoint/2010/main" val="1794670131"/>
       </p:ext>
     </p:extLst>
   </p:cSld>
@@ -855,7 +855,7 @@
           <a:p>
             <a:fld id="{F8F920B2-3E99-4C9D-9450-62A3DEC5476B}" type="datetimeFigureOut">
               <a:rPr lang="en-US" smtClean="0"/>
-              <a:t>10/12/2017</a:t>
+              <a:t>10/25/2017</a:t>
             </a:fld>
             <a:endParaRPr lang="en-US"/>
           </a:p>
@@ -906,7 +906,7 @@
     </p:spTree>
     <p:extLst>
       <p:ext uri="{BB962C8B-B14F-4D97-AF65-F5344CB8AC3E}">
-        <p14:creationId xmlns:p14="http://schemas.microsoft.com/office/powerpoint/2010/main" val="4272540088"/>
+        <p14:creationId xmlns:p14="http://schemas.microsoft.com/office/powerpoint/2010/main" val="930212756"/>
       </p:ext>
     </p:extLst>
   </p:cSld>
@@ -945,8 +945,8 @@
         </p:nvSpPr>
         <p:spPr>
           <a:xfrm>
-            <a:off x="18322291" y="973667"/>
-            <a:ext cx="5520690" cy="15498235"/>
+            <a:off x="19631027" y="973667"/>
+            <a:ext cx="5915025" cy="15498235"/>
           </a:xfrm>
         </p:spPr>
         <p:txBody>
@@ -973,8 +973,8 @@
         </p:nvSpPr>
         <p:spPr>
           <a:xfrm>
-            <a:off x="1760221" y="973667"/>
-            <a:ext cx="16242030" cy="15498235"/>
+            <a:off x="1885952" y="973667"/>
+            <a:ext cx="17402175" cy="15498235"/>
           </a:xfrm>
         </p:spPr>
         <p:txBody>
@@ -1035,7 +1035,7 @@
           <a:p>
             <a:fld id="{F8F920B2-3E99-4C9D-9450-62A3DEC5476B}" type="datetimeFigureOut">
               <a:rPr lang="en-US" smtClean="0"/>
-              <a:t>10/12/2017</a:t>
+              <a:t>10/25/2017</a:t>
             </a:fld>
             <a:endParaRPr lang="en-US"/>
           </a:p>
@@ -1086,7 +1086,7 @@
     </p:spTree>
     <p:extLst>
       <p:ext uri="{BB962C8B-B14F-4D97-AF65-F5344CB8AC3E}">
-        <p14:creationId xmlns:p14="http://schemas.microsoft.com/office/powerpoint/2010/main" val="382989275"/>
+        <p14:creationId xmlns:p14="http://schemas.microsoft.com/office/powerpoint/2010/main" val="3989422453"/>
       </p:ext>
     </p:extLst>
   </p:cSld>
@@ -1205,7 +1205,7 @@
           <a:p>
             <a:fld id="{F8F920B2-3E99-4C9D-9450-62A3DEC5476B}" type="datetimeFigureOut">
               <a:rPr lang="en-US" smtClean="0"/>
-              <a:t>10/12/2017</a:t>
+              <a:t>10/25/2017</a:t>
             </a:fld>
             <a:endParaRPr lang="en-US"/>
           </a:p>
@@ -1256,7 +1256,7 @@
     </p:spTree>
     <p:extLst>
       <p:ext uri="{BB962C8B-B14F-4D97-AF65-F5344CB8AC3E}">
-        <p14:creationId xmlns:p14="http://schemas.microsoft.com/office/powerpoint/2010/main" val="435677612"/>
+        <p14:creationId xmlns:p14="http://schemas.microsoft.com/office/powerpoint/2010/main" val="4118258925"/>
       </p:ext>
     </p:extLst>
   </p:cSld>
@@ -1295,8 +1295,8 @@
         </p:nvSpPr>
         <p:spPr>
           <a:xfrm>
-            <a:off x="1746886" y="4559305"/>
-            <a:ext cx="22082760" cy="7607299"/>
+            <a:off x="1871664" y="4559305"/>
+            <a:ext cx="23660100" cy="7607299"/>
           </a:xfrm>
         </p:spPr>
         <p:txBody>
@@ -1327,8 +1327,8 @@
         </p:nvSpPr>
         <p:spPr>
           <a:xfrm>
-            <a:off x="1746886" y="12238572"/>
-            <a:ext cx="22082760" cy="4000499"/>
+            <a:off x="1871664" y="12238572"/>
+            <a:ext cx="23660100" cy="4000499"/>
           </a:xfrm>
         </p:spPr>
         <p:txBody>
@@ -1449,7 +1449,7 @@
           <a:p>
             <a:fld id="{F8F920B2-3E99-4C9D-9450-62A3DEC5476B}" type="datetimeFigureOut">
               <a:rPr lang="en-US" smtClean="0"/>
-              <a:t>10/12/2017</a:t>
+              <a:t>10/25/2017</a:t>
             </a:fld>
             <a:endParaRPr lang="en-US"/>
           </a:p>
@@ -1500,7 +1500,7 @@
     </p:spTree>
     <p:extLst>
       <p:ext uri="{BB962C8B-B14F-4D97-AF65-F5344CB8AC3E}">
-        <p14:creationId xmlns:p14="http://schemas.microsoft.com/office/powerpoint/2010/main" val="1990666383"/>
+        <p14:creationId xmlns:p14="http://schemas.microsoft.com/office/powerpoint/2010/main" val="3244784299"/>
       </p:ext>
     </p:extLst>
   </p:cSld>
@@ -1562,8 +1562,8 @@
         </p:nvSpPr>
         <p:spPr>
           <a:xfrm>
-            <a:off x="1760220" y="4868333"/>
-            <a:ext cx="10881360" cy="11603568"/>
+            <a:off x="1885950" y="4868333"/>
+            <a:ext cx="11658600" cy="11603568"/>
           </a:xfrm>
         </p:spPr>
         <p:txBody>
@@ -1619,8 +1619,8 @@
         </p:nvSpPr>
         <p:spPr>
           <a:xfrm>
-            <a:off x="12961620" y="4868333"/>
-            <a:ext cx="10881360" cy="11603568"/>
+            <a:off x="13887450" y="4868333"/>
+            <a:ext cx="11658600" cy="11603568"/>
           </a:xfrm>
         </p:spPr>
         <p:txBody>
@@ -1681,7 +1681,7 @@
           <a:p>
             <a:fld id="{F8F920B2-3E99-4C9D-9450-62A3DEC5476B}" type="datetimeFigureOut">
               <a:rPr lang="en-US" smtClean="0"/>
-              <a:t>10/12/2017</a:t>
+              <a:t>10/25/2017</a:t>
             </a:fld>
             <a:endParaRPr lang="en-US"/>
           </a:p>
@@ -1732,7 +1732,7 @@
     </p:spTree>
     <p:extLst>
       <p:ext uri="{BB962C8B-B14F-4D97-AF65-F5344CB8AC3E}">
-        <p14:creationId xmlns:p14="http://schemas.microsoft.com/office/powerpoint/2010/main" val="3119035017"/>
+        <p14:creationId xmlns:p14="http://schemas.microsoft.com/office/powerpoint/2010/main" val="3949240212"/>
       </p:ext>
     </p:extLst>
   </p:cSld>
@@ -1771,8 +1771,8 @@
         </p:nvSpPr>
         <p:spPr>
           <a:xfrm>
-            <a:off x="1763555" y="973671"/>
-            <a:ext cx="22082760" cy="3534835"/>
+            <a:off x="1889523" y="973671"/>
+            <a:ext cx="23660100" cy="3534835"/>
           </a:xfrm>
         </p:spPr>
         <p:txBody>
@@ -1799,8 +1799,8 @@
         </p:nvSpPr>
         <p:spPr>
           <a:xfrm>
-            <a:off x="1763558" y="4483101"/>
-            <a:ext cx="10831352" cy="2197099"/>
+            <a:off x="1889526" y="4483101"/>
+            <a:ext cx="11605020" cy="2197099"/>
           </a:xfrm>
         </p:spPr>
         <p:txBody>
@@ -1864,8 +1864,8 @@
         </p:nvSpPr>
         <p:spPr>
           <a:xfrm>
-            <a:off x="1763558" y="6680200"/>
-            <a:ext cx="10831352" cy="9825568"/>
+            <a:off x="1889526" y="6680200"/>
+            <a:ext cx="11605020" cy="9825568"/>
           </a:xfrm>
         </p:spPr>
         <p:txBody>
@@ -1921,8 +1921,8 @@
         </p:nvSpPr>
         <p:spPr>
           <a:xfrm>
-            <a:off x="12961621" y="4483101"/>
-            <a:ext cx="10884695" cy="2197099"/>
+            <a:off x="13887452" y="4483101"/>
+            <a:ext cx="11662173" cy="2197099"/>
           </a:xfrm>
         </p:spPr>
         <p:txBody>
@@ -1986,8 +1986,8 @@
         </p:nvSpPr>
         <p:spPr>
           <a:xfrm>
-            <a:off x="12961621" y="6680200"/>
-            <a:ext cx="10884695" cy="9825568"/>
+            <a:off x="13887452" y="6680200"/>
+            <a:ext cx="11662173" cy="9825568"/>
           </a:xfrm>
         </p:spPr>
         <p:txBody>
@@ -2048,7 +2048,7 @@
           <a:p>
             <a:fld id="{F8F920B2-3E99-4C9D-9450-62A3DEC5476B}" type="datetimeFigureOut">
               <a:rPr lang="en-US" smtClean="0"/>
-              <a:t>10/12/2017</a:t>
+              <a:t>10/25/2017</a:t>
             </a:fld>
             <a:endParaRPr lang="en-US"/>
           </a:p>
@@ -2099,7 +2099,7 @@
     </p:spTree>
     <p:extLst>
       <p:ext uri="{BB962C8B-B14F-4D97-AF65-F5344CB8AC3E}">
-        <p14:creationId xmlns:p14="http://schemas.microsoft.com/office/powerpoint/2010/main" val="1217456912"/>
+        <p14:creationId xmlns:p14="http://schemas.microsoft.com/office/powerpoint/2010/main" val="2507165435"/>
       </p:ext>
     </p:extLst>
   </p:cSld>
@@ -2166,7 +2166,7 @@
           <a:p>
             <a:fld id="{F8F920B2-3E99-4C9D-9450-62A3DEC5476B}" type="datetimeFigureOut">
               <a:rPr lang="en-US" smtClean="0"/>
-              <a:t>10/12/2017</a:t>
+              <a:t>10/25/2017</a:t>
             </a:fld>
             <a:endParaRPr lang="en-US"/>
           </a:p>
@@ -2217,7 +2217,7 @@
     </p:spTree>
     <p:extLst>
       <p:ext uri="{BB962C8B-B14F-4D97-AF65-F5344CB8AC3E}">
-        <p14:creationId xmlns:p14="http://schemas.microsoft.com/office/powerpoint/2010/main" val="1153296595"/>
+        <p14:creationId xmlns:p14="http://schemas.microsoft.com/office/powerpoint/2010/main" val="662295828"/>
       </p:ext>
     </p:extLst>
   </p:cSld>
@@ -2261,7 +2261,7 @@
           <a:p>
             <a:fld id="{F8F920B2-3E99-4C9D-9450-62A3DEC5476B}" type="datetimeFigureOut">
               <a:rPr lang="en-US" smtClean="0"/>
-              <a:t>10/12/2017</a:t>
+              <a:t>10/25/2017</a:t>
             </a:fld>
             <a:endParaRPr lang="en-US"/>
           </a:p>
@@ -2312,7 +2312,7 @@
     </p:spTree>
     <p:extLst>
       <p:ext uri="{BB962C8B-B14F-4D97-AF65-F5344CB8AC3E}">
-        <p14:creationId xmlns:p14="http://schemas.microsoft.com/office/powerpoint/2010/main" val="1600779657"/>
+        <p14:creationId xmlns:p14="http://schemas.microsoft.com/office/powerpoint/2010/main" val="2858160493"/>
       </p:ext>
     </p:extLst>
   </p:cSld>
@@ -2351,8 +2351,8 @@
         </p:nvSpPr>
         <p:spPr>
           <a:xfrm>
-            <a:off x="1763555" y="1219200"/>
-            <a:ext cx="8257698" cy="4267200"/>
+            <a:off x="1889523" y="1219200"/>
+            <a:ext cx="8847534" cy="4267200"/>
           </a:xfrm>
         </p:spPr>
         <p:txBody>
@@ -2383,8 +2383,8 @@
         </p:nvSpPr>
         <p:spPr>
           <a:xfrm>
-            <a:off x="10884695" y="2633138"/>
-            <a:ext cx="12961620" cy="12996333"/>
+            <a:off x="11662173" y="2633138"/>
+            <a:ext cx="13887450" cy="12996333"/>
           </a:xfrm>
         </p:spPr>
         <p:txBody>
@@ -2468,8 +2468,8 @@
         </p:nvSpPr>
         <p:spPr>
           <a:xfrm>
-            <a:off x="1763555" y="5486400"/>
-            <a:ext cx="8257698" cy="10164235"/>
+            <a:off x="1889523" y="5486400"/>
+            <a:ext cx="8847534" cy="10164235"/>
           </a:xfrm>
         </p:spPr>
         <p:txBody>
@@ -2538,7 +2538,7 @@
           <a:p>
             <a:fld id="{F8F920B2-3E99-4C9D-9450-62A3DEC5476B}" type="datetimeFigureOut">
               <a:rPr lang="en-US" smtClean="0"/>
-              <a:t>10/12/2017</a:t>
+              <a:t>10/25/2017</a:t>
             </a:fld>
             <a:endParaRPr lang="en-US"/>
           </a:p>
@@ -2589,7 +2589,7 @@
     </p:spTree>
     <p:extLst>
       <p:ext uri="{BB962C8B-B14F-4D97-AF65-F5344CB8AC3E}">
-        <p14:creationId xmlns:p14="http://schemas.microsoft.com/office/powerpoint/2010/main" val="697443860"/>
+        <p14:creationId xmlns:p14="http://schemas.microsoft.com/office/powerpoint/2010/main" val="129491679"/>
       </p:ext>
     </p:extLst>
   </p:cSld>
@@ -2628,8 +2628,8 @@
         </p:nvSpPr>
         <p:spPr>
           <a:xfrm>
-            <a:off x="1763555" y="1219200"/>
-            <a:ext cx="8257698" cy="4267200"/>
+            <a:off x="1889523" y="1219200"/>
+            <a:ext cx="8847534" cy="4267200"/>
           </a:xfrm>
         </p:spPr>
         <p:txBody>
@@ -2660,8 +2660,8 @@
         </p:nvSpPr>
         <p:spPr>
           <a:xfrm>
-            <a:off x="10884695" y="2633138"/>
-            <a:ext cx="12961620" cy="12996333"/>
+            <a:off x="11662173" y="2633138"/>
+            <a:ext cx="13887450" cy="12996333"/>
           </a:xfrm>
         </p:spPr>
         <p:txBody>
@@ -2725,8 +2725,8 @@
         </p:nvSpPr>
         <p:spPr>
           <a:xfrm>
-            <a:off x="1763555" y="5486400"/>
-            <a:ext cx="8257698" cy="10164235"/>
+            <a:off x="1889523" y="5486400"/>
+            <a:ext cx="8847534" cy="10164235"/>
           </a:xfrm>
         </p:spPr>
         <p:txBody>
@@ -2795,7 +2795,7 @@
           <a:p>
             <a:fld id="{F8F920B2-3E99-4C9D-9450-62A3DEC5476B}" type="datetimeFigureOut">
               <a:rPr lang="en-US" smtClean="0"/>
-              <a:t>10/12/2017</a:t>
+              <a:t>10/25/2017</a:t>
             </a:fld>
             <a:endParaRPr lang="en-US"/>
           </a:p>
@@ -2846,7 +2846,7 @@
     </p:spTree>
     <p:extLst>
       <p:ext uri="{BB962C8B-B14F-4D97-AF65-F5344CB8AC3E}">
-        <p14:creationId xmlns:p14="http://schemas.microsoft.com/office/powerpoint/2010/main" val="3871417374"/>
+        <p14:creationId xmlns:p14="http://schemas.microsoft.com/office/powerpoint/2010/main" val="3452006532"/>
       </p:ext>
     </p:extLst>
   </p:cSld>
@@ -2890,8 +2890,8 @@
         </p:nvSpPr>
         <p:spPr>
           <a:xfrm>
-            <a:off x="1760220" y="973671"/>
-            <a:ext cx="22082760" cy="3534835"/>
+            <a:off x="1885950" y="973671"/>
+            <a:ext cx="23660100" cy="3534835"/>
           </a:xfrm>
           <a:prstGeom prst="rect">
             <a:avLst/>
@@ -2923,8 +2923,8 @@
         </p:nvSpPr>
         <p:spPr>
           <a:xfrm>
-            <a:off x="1760220" y="4868333"/>
-            <a:ext cx="22082760" cy="11603568"/>
+            <a:off x="1885950" y="4868333"/>
+            <a:ext cx="23660100" cy="11603568"/>
           </a:xfrm>
           <a:prstGeom prst="rect">
             <a:avLst/>
@@ -2985,8 +2985,8 @@
         </p:nvSpPr>
         <p:spPr>
           <a:xfrm>
-            <a:off x="1760220" y="16950271"/>
-            <a:ext cx="5760720" cy="973667"/>
+            <a:off x="1885950" y="16950271"/>
+            <a:ext cx="6172200" cy="973667"/>
           </a:xfrm>
           <a:prstGeom prst="rect">
             <a:avLst/>
@@ -3008,7 +3008,7 @@
           <a:p>
             <a:fld id="{F8F920B2-3E99-4C9D-9450-62A3DEC5476B}" type="datetimeFigureOut">
               <a:rPr lang="en-US" smtClean="0"/>
-              <a:t>10/12/2017</a:t>
+              <a:t>10/25/2017</a:t>
             </a:fld>
             <a:endParaRPr lang="en-US"/>
           </a:p>
@@ -3026,8 +3026,8 @@
         </p:nvSpPr>
         <p:spPr>
           <a:xfrm>
-            <a:off x="8481060" y="16950271"/>
-            <a:ext cx="8641080" cy="973667"/>
+            <a:off x="9086850" y="16950271"/>
+            <a:ext cx="9258300" cy="973667"/>
           </a:xfrm>
           <a:prstGeom prst="rect">
             <a:avLst/>
@@ -3063,8 +3063,8 @@
         </p:nvSpPr>
         <p:spPr>
           <a:xfrm>
-            <a:off x="18082260" y="16950271"/>
-            <a:ext cx="5760720" cy="973667"/>
+            <a:off x="19373850" y="16950271"/>
+            <a:ext cx="6172200" cy="973667"/>
           </a:xfrm>
           <a:prstGeom prst="rect">
             <a:avLst/>
@@ -3095,23 +3095,23 @@
     </p:spTree>
     <p:extLst>
       <p:ext uri="{BB962C8B-B14F-4D97-AF65-F5344CB8AC3E}">
-        <p14:creationId xmlns:p14="http://schemas.microsoft.com/office/powerpoint/2010/main" val="466422031"/>
+        <p14:creationId xmlns:p14="http://schemas.microsoft.com/office/powerpoint/2010/main" val="1415131070"/>
       </p:ext>
     </p:extLst>
   </p:cSld>
   <p:clrMap bg1="lt1" tx1="dk1" bg2="lt2" tx2="dk2" accent1="accent1" accent2="accent2" accent3="accent3" accent4="accent4" accent5="accent5" accent6="accent6" hlink="hlink" folHlink="folHlink"/>
   <p:sldLayoutIdLst>
-    <p:sldLayoutId id="2147484514" r:id="rId1"/>
-    <p:sldLayoutId id="2147484515" r:id="rId2"/>
-    <p:sldLayoutId id="2147484516" r:id="rId3"/>
-    <p:sldLayoutId id="2147484517" r:id="rId4"/>
-    <p:sldLayoutId id="2147484518" r:id="rId5"/>
-    <p:sldLayoutId id="2147484519" r:id="rId6"/>
-    <p:sldLayoutId id="2147484520" r:id="rId7"/>
-    <p:sldLayoutId id="2147484521" r:id="rId8"/>
-    <p:sldLayoutId id="2147484522" r:id="rId9"/>
-    <p:sldLayoutId id="2147484523" r:id="rId10"/>
-    <p:sldLayoutId id="2147484524" r:id="rId11"/>
+    <p:sldLayoutId id="2147484538" r:id="rId1"/>
+    <p:sldLayoutId id="2147484539" r:id="rId2"/>
+    <p:sldLayoutId id="2147484540" r:id="rId3"/>
+    <p:sldLayoutId id="2147484541" r:id="rId4"/>
+    <p:sldLayoutId id="2147484542" r:id="rId5"/>
+    <p:sldLayoutId id="2147484543" r:id="rId6"/>
+    <p:sldLayoutId id="2147484544" r:id="rId7"/>
+    <p:sldLayoutId id="2147484545" r:id="rId8"/>
+    <p:sldLayoutId id="2147484546" r:id="rId9"/>
+    <p:sldLayoutId id="2147484547" r:id="rId10"/>
+    <p:sldLayoutId id="2147484548" r:id="rId11"/>
   </p:sldLayoutIdLst>
   <p:txStyles>
     <p:titleStyle>
@@ -3421,7 +3421,7 @@
         </p:nvSpPr>
         <p:spPr>
           <a:xfrm>
-            <a:off x="304800" y="5562600"/>
+            <a:off x="533400" y="4191000"/>
             <a:ext cx="1524000" cy="228600"/>
           </a:xfrm>
           <a:prstGeom prst="roundRect">
@@ -3479,7 +3479,7 @@
         </p:nvCxnSpPr>
         <p:spPr>
           <a:xfrm flipV="1">
-            <a:off x="609600" y="11201400"/>
+            <a:off x="838200" y="11201400"/>
             <a:ext cx="152400" cy="152404"/>
           </a:xfrm>
           <a:prstGeom prst="line">
@@ -3516,7 +3516,7 @@
         </p:nvSpPr>
         <p:spPr>
           <a:xfrm>
-            <a:off x="914400" y="11125200"/>
+            <a:off x="1143000" y="11125200"/>
             <a:ext cx="457200" cy="152400"/>
           </a:xfrm>
           <a:prstGeom prst="rect">
@@ -3568,7 +3568,7 @@
         </p:nvSpPr>
         <p:spPr>
           <a:xfrm>
-            <a:off x="609601" y="11125200"/>
+            <a:off x="838201" y="11125200"/>
             <a:ext cx="152400" cy="76200"/>
           </a:xfrm>
           <a:prstGeom prst="rect">
@@ -3621,7 +3621,7 @@
         </p:nvSpPr>
         <p:spPr>
           <a:xfrm>
-            <a:off x="304800" y="11201400"/>
+            <a:off x="533400" y="11201400"/>
             <a:ext cx="228600" cy="152400"/>
           </a:xfrm>
           <a:prstGeom prst="homePlate">
@@ -3674,8 +3674,8 @@
         </p:nvCxnSpPr>
         <p:spPr>
           <a:xfrm>
-            <a:off x="533400" y="11277600"/>
-            <a:ext cx="11963400" cy="0"/>
+            <a:off x="762000" y="11277600"/>
+            <a:ext cx="13182600" cy="0"/>
           </a:xfrm>
           <a:prstGeom prst="line">
             <a:avLst/>
@@ -3711,7 +3711,7 @@
         </p:nvCxnSpPr>
         <p:spPr>
           <a:xfrm>
-            <a:off x="12496800" y="9220200"/>
+            <a:off x="13944600" y="9220200"/>
             <a:ext cx="0" cy="2057400"/>
           </a:xfrm>
           <a:prstGeom prst="line">
@@ -3748,7 +3748,7 @@
         </p:nvSpPr>
         <p:spPr>
           <a:xfrm>
-            <a:off x="8077200" y="8153400"/>
+            <a:off x="9525000" y="8153400"/>
             <a:ext cx="457200" cy="152400"/>
           </a:xfrm>
           <a:prstGeom prst="rect">
@@ -3801,7 +3801,7 @@
         </p:nvSpPr>
         <p:spPr>
           <a:xfrm>
-            <a:off x="8077200" y="8458200"/>
+            <a:off x="9525000" y="8458200"/>
             <a:ext cx="457200" cy="152400"/>
           </a:xfrm>
           <a:prstGeom prst="rect">
@@ -3854,7 +3854,7 @@
         </p:nvSpPr>
         <p:spPr>
           <a:xfrm>
-            <a:off x="8077200" y="9067800"/>
+            <a:off x="9525000" y="9067800"/>
             <a:ext cx="457200" cy="152400"/>
           </a:xfrm>
           <a:prstGeom prst="rect">
@@ -3907,7 +3907,7 @@
         </p:nvSpPr>
         <p:spPr>
           <a:xfrm>
-            <a:off x="8077200" y="8763000"/>
+            <a:off x="9525000" y="8763000"/>
             <a:ext cx="457200" cy="152400"/>
           </a:xfrm>
           <a:prstGeom prst="rect">
@@ -3960,7 +3960,7 @@
         </p:nvSpPr>
         <p:spPr>
           <a:xfrm>
-            <a:off x="7315200" y="8458200"/>
+            <a:off x="8763000" y="8458200"/>
             <a:ext cx="457200" cy="152400"/>
           </a:xfrm>
           <a:prstGeom prst="rect">
@@ -4012,7 +4012,7 @@
         </p:nvSpPr>
         <p:spPr>
           <a:xfrm>
-            <a:off x="7315200" y="8763000"/>
+            <a:off x="8763000" y="8763000"/>
             <a:ext cx="457200" cy="152400"/>
           </a:xfrm>
           <a:prstGeom prst="rect">
@@ -4064,7 +4064,7 @@
         </p:nvSpPr>
         <p:spPr>
           <a:xfrm>
-            <a:off x="7315200" y="9067800"/>
+            <a:off x="8763000" y="9067800"/>
             <a:ext cx="457200" cy="152400"/>
           </a:xfrm>
           <a:prstGeom prst="rect">
@@ -4116,7 +4116,7 @@
         </p:nvSpPr>
         <p:spPr>
           <a:xfrm>
-            <a:off x="7315200" y="9372600"/>
+            <a:off x="8763000" y="9372600"/>
             <a:ext cx="457200" cy="152400"/>
           </a:xfrm>
           <a:prstGeom prst="rect">
@@ -4168,7 +4168,7 @@
         </p:nvSpPr>
         <p:spPr>
           <a:xfrm>
-            <a:off x="7315200" y="7467600"/>
+            <a:off x="8763000" y="7467600"/>
             <a:ext cx="1219200" cy="2286000"/>
           </a:xfrm>
           <a:prstGeom prst="rect">
@@ -4230,7 +4230,7 @@
         </p:nvCxnSpPr>
         <p:spPr>
           <a:xfrm>
-            <a:off x="7315200" y="9144000"/>
+            <a:off x="8763000" y="9144000"/>
             <a:ext cx="76200" cy="76200"/>
           </a:xfrm>
           <a:prstGeom prst="line">
@@ -4265,7 +4265,7 @@
         </p:nvCxnSpPr>
         <p:spPr>
           <a:xfrm flipH="1">
-            <a:off x="7315200" y="9220200"/>
+            <a:off x="8763000" y="9220200"/>
             <a:ext cx="76200" cy="76200"/>
           </a:xfrm>
           <a:prstGeom prst="line">
@@ -4300,7 +4300,7 @@
         </p:nvCxnSpPr>
         <p:spPr>
           <a:xfrm flipH="1">
-            <a:off x="8458200" y="9144000"/>
+            <a:off x="9906000" y="9144000"/>
             <a:ext cx="76200" cy="76200"/>
           </a:xfrm>
           <a:prstGeom prst="line">
@@ -4335,7 +4335,7 @@
         </p:nvCxnSpPr>
         <p:spPr>
           <a:xfrm>
-            <a:off x="8458200" y="9220200"/>
+            <a:off x="9906000" y="9220200"/>
             <a:ext cx="76200" cy="76200"/>
           </a:xfrm>
           <a:prstGeom prst="line">
@@ -4370,7 +4370,7 @@
         </p:nvSpPr>
         <p:spPr>
           <a:xfrm>
-            <a:off x="7315200" y="8153400"/>
+            <a:off x="8763000" y="7848600"/>
             <a:ext cx="457200" cy="152400"/>
           </a:xfrm>
           <a:prstGeom prst="rect">
@@ -4422,7 +4422,7 @@
         </p:nvSpPr>
         <p:spPr>
           <a:xfrm>
-            <a:off x="7315200" y="7162800"/>
+            <a:off x="8763000" y="7162800"/>
             <a:ext cx="457200" cy="304800"/>
           </a:xfrm>
           <a:prstGeom prst="rect">
@@ -4493,7 +4493,7 @@
         </p:nvSpPr>
         <p:spPr>
           <a:xfrm>
-            <a:off x="8077200" y="9372600"/>
+            <a:off x="9525000" y="9372600"/>
             <a:ext cx="457200" cy="152400"/>
           </a:xfrm>
           <a:prstGeom prst="rect">
@@ -4546,7 +4546,7 @@
         </p:nvSpPr>
         <p:spPr>
           <a:xfrm>
-            <a:off x="5334000" y="8153400"/>
+            <a:off x="5562600" y="8153400"/>
             <a:ext cx="457200" cy="152400"/>
           </a:xfrm>
           <a:prstGeom prst="rect">
@@ -4599,7 +4599,7 @@
         </p:nvSpPr>
         <p:spPr>
           <a:xfrm>
-            <a:off x="5334000" y="8763000"/>
+            <a:off x="5562600" y="8763000"/>
             <a:ext cx="457200" cy="152400"/>
           </a:xfrm>
           <a:prstGeom prst="rect">
@@ -4652,7 +4652,7 @@
         </p:nvSpPr>
         <p:spPr>
           <a:xfrm>
-            <a:off x="4572000" y="6858000"/>
+            <a:off x="4800600" y="6858000"/>
             <a:ext cx="457200" cy="152400"/>
           </a:xfrm>
           <a:prstGeom prst="rect">
@@ -4704,7 +4704,7 @@
         </p:nvSpPr>
         <p:spPr>
           <a:xfrm>
-            <a:off x="4572000" y="8458200"/>
+            <a:off x="4800600" y="8458200"/>
             <a:ext cx="457200" cy="152400"/>
           </a:xfrm>
           <a:prstGeom prst="rect">
@@ -4756,7 +4756,7 @@
         </p:nvSpPr>
         <p:spPr>
           <a:xfrm>
-            <a:off x="4572000" y="8839200"/>
+            <a:off x="4800600" y="8839200"/>
             <a:ext cx="457200" cy="152400"/>
           </a:xfrm>
           <a:prstGeom prst="rect">
@@ -4808,7 +4808,7 @@
         </p:nvSpPr>
         <p:spPr>
           <a:xfrm>
-            <a:off x="4572000" y="6553200"/>
+            <a:off x="4800600" y="6553200"/>
             <a:ext cx="1219200" cy="2895600"/>
           </a:xfrm>
           <a:prstGeom prst="rect">
@@ -4870,7 +4870,7 @@
         </p:nvCxnSpPr>
         <p:spPr>
           <a:xfrm>
-            <a:off x="4572000" y="8534400"/>
+            <a:off x="4800600" y="8534400"/>
             <a:ext cx="76200" cy="76200"/>
           </a:xfrm>
           <a:prstGeom prst="line">
@@ -4905,7 +4905,7 @@
         </p:nvCxnSpPr>
         <p:spPr>
           <a:xfrm flipH="1">
-            <a:off x="4572000" y="8610600"/>
+            <a:off x="4800600" y="8610600"/>
             <a:ext cx="76200" cy="76200"/>
           </a:xfrm>
           <a:prstGeom prst="line">
@@ -4940,7 +4940,7 @@
         </p:nvSpPr>
         <p:spPr>
           <a:xfrm>
-            <a:off x="4572000" y="6400800"/>
+            <a:off x="4800600" y="6400800"/>
             <a:ext cx="457200" cy="152400"/>
           </a:xfrm>
           <a:prstGeom prst="rect">
@@ -4999,7 +4999,7 @@
         </p:nvSpPr>
         <p:spPr>
           <a:xfrm>
-            <a:off x="5334000" y="8458200"/>
+            <a:off x="5562600" y="8458200"/>
             <a:ext cx="457200" cy="152400"/>
           </a:xfrm>
           <a:prstGeom prst="rect">
@@ -5052,7 +5052,7 @@
         </p:nvSpPr>
         <p:spPr>
           <a:xfrm>
-            <a:off x="10820400" y="8153400"/>
+            <a:off x="12268200" y="8153400"/>
             <a:ext cx="457200" cy="152400"/>
           </a:xfrm>
           <a:prstGeom prst="rect">
@@ -5105,7 +5105,7 @@
         </p:nvSpPr>
         <p:spPr>
           <a:xfrm>
-            <a:off x="10820400" y="9067800"/>
+            <a:off x="12268200" y="9067800"/>
             <a:ext cx="457200" cy="152400"/>
           </a:xfrm>
           <a:prstGeom prst="rect">
@@ -5158,7 +5158,7 @@
         </p:nvSpPr>
         <p:spPr>
           <a:xfrm>
-            <a:off x="10820400" y="9372600"/>
+            <a:off x="12268200" y="9372600"/>
             <a:ext cx="457200" cy="152400"/>
           </a:xfrm>
           <a:prstGeom prst="rect">
@@ -5211,7 +5211,7 @@
         </p:nvSpPr>
         <p:spPr>
           <a:xfrm>
-            <a:off x="10058400" y="7467600"/>
+            <a:off x="11506200" y="7467600"/>
             <a:ext cx="1219200" cy="2286000"/>
           </a:xfrm>
           <a:prstGeom prst="rect">
@@ -5273,7 +5273,7 @@
         </p:nvSpPr>
         <p:spPr>
           <a:xfrm>
-            <a:off x="10058400" y="8153400"/>
+            <a:off x="11506200" y="8153400"/>
             <a:ext cx="457200" cy="152400"/>
           </a:xfrm>
           <a:prstGeom prst="rect">
@@ -5325,7 +5325,7 @@
         </p:nvSpPr>
         <p:spPr>
           <a:xfrm>
-            <a:off x="10058400" y="7315200"/>
+            <a:off x="11506200" y="7315200"/>
             <a:ext cx="457200" cy="152400"/>
           </a:xfrm>
           <a:prstGeom prst="rect">
@@ -5384,7 +5384,7 @@
         </p:nvSpPr>
         <p:spPr>
           <a:xfrm>
-            <a:off x="10058400" y="9067800"/>
+            <a:off x="11506200" y="9067800"/>
             <a:ext cx="457200" cy="152400"/>
           </a:xfrm>
           <a:prstGeom prst="rect">
@@ -5436,7 +5436,7 @@
         </p:nvCxnSpPr>
         <p:spPr>
           <a:xfrm>
-            <a:off x="10058400" y="9144000"/>
+            <a:off x="11506200" y="9144000"/>
             <a:ext cx="76200" cy="76200"/>
           </a:xfrm>
           <a:prstGeom prst="line">
@@ -5471,7 +5471,7 @@
         </p:nvCxnSpPr>
         <p:spPr>
           <a:xfrm flipH="1">
-            <a:off x="10058400" y="9220200"/>
+            <a:off x="11506200" y="9220200"/>
             <a:ext cx="76200" cy="76200"/>
           </a:xfrm>
           <a:prstGeom prst="line">
@@ -5506,7 +5506,7 @@
         </p:nvSpPr>
         <p:spPr>
           <a:xfrm>
-            <a:off x="14782800" y="8153400"/>
+            <a:off x="16230600" y="8153400"/>
             <a:ext cx="457200" cy="152400"/>
           </a:xfrm>
           <a:prstGeom prst="rect">
@@ -5559,7 +5559,7 @@
         </p:nvSpPr>
         <p:spPr>
           <a:xfrm>
-            <a:off x="14020800" y="7467600"/>
+            <a:off x="15468600" y="7467600"/>
             <a:ext cx="1219200" cy="2286000"/>
           </a:xfrm>
           <a:prstGeom prst="rect">
@@ -5621,7 +5621,7 @@
         </p:nvSpPr>
         <p:spPr>
           <a:xfrm>
-            <a:off x="14020800" y="8153400"/>
+            <a:off x="15468600" y="8153400"/>
             <a:ext cx="457200" cy="152400"/>
           </a:xfrm>
           <a:prstGeom prst="rect">
@@ -5673,7 +5673,7 @@
         </p:nvSpPr>
         <p:spPr>
           <a:xfrm>
-            <a:off x="14020800" y="7315200"/>
+            <a:off x="15468600" y="7315200"/>
             <a:ext cx="457200" cy="152400"/>
           </a:xfrm>
           <a:prstGeom prst="rect">
@@ -5732,7 +5732,7 @@
         </p:nvSpPr>
         <p:spPr>
           <a:xfrm>
-            <a:off x="14020800" y="7848600"/>
+            <a:off x="15468600" y="7848600"/>
             <a:ext cx="457200" cy="152400"/>
           </a:xfrm>
           <a:prstGeom prst="rect">
@@ -5784,7 +5784,7 @@
         </p:nvSpPr>
         <p:spPr>
           <a:xfrm>
-            <a:off x="17526000" y="8153400"/>
+            <a:off x="18973800" y="8153400"/>
             <a:ext cx="457200" cy="152400"/>
           </a:xfrm>
           <a:prstGeom prst="rect">
@@ -5837,7 +5837,7 @@
         </p:nvSpPr>
         <p:spPr>
           <a:xfrm>
-            <a:off x="17526000" y="8458200"/>
+            <a:off x="18973800" y="8458200"/>
             <a:ext cx="457200" cy="152400"/>
           </a:xfrm>
           <a:prstGeom prst="rect">
@@ -5890,7 +5890,7 @@
         </p:nvSpPr>
         <p:spPr>
           <a:xfrm>
-            <a:off x="17526000" y="9067800"/>
+            <a:off x="18973800" y="9067800"/>
             <a:ext cx="457200" cy="152400"/>
           </a:xfrm>
           <a:prstGeom prst="rect">
@@ -5943,7 +5943,7 @@
         </p:nvSpPr>
         <p:spPr>
           <a:xfrm>
-            <a:off x="17526000" y="8763000"/>
+            <a:off x="18973800" y="8763000"/>
             <a:ext cx="457200" cy="152400"/>
           </a:xfrm>
           <a:prstGeom prst="rect">
@@ -5996,7 +5996,7 @@
         </p:nvSpPr>
         <p:spPr>
           <a:xfrm>
-            <a:off x="16764000" y="8458200"/>
+            <a:off x="18211800" y="8458200"/>
             <a:ext cx="457200" cy="152400"/>
           </a:xfrm>
           <a:prstGeom prst="rect">
@@ -6048,7 +6048,7 @@
         </p:nvSpPr>
         <p:spPr>
           <a:xfrm>
-            <a:off x="16764000" y="8763000"/>
+            <a:off x="18211800" y="8763000"/>
             <a:ext cx="457200" cy="152400"/>
           </a:xfrm>
           <a:prstGeom prst="rect">
@@ -6100,7 +6100,7 @@
         </p:nvSpPr>
         <p:spPr>
           <a:xfrm>
-            <a:off x="16764000" y="9067800"/>
+            <a:off x="18211800" y="9067800"/>
             <a:ext cx="457200" cy="152400"/>
           </a:xfrm>
           <a:prstGeom prst="rect">
@@ -6152,7 +6152,7 @@
         </p:nvSpPr>
         <p:spPr>
           <a:xfrm>
-            <a:off x="16764000" y="9372600"/>
+            <a:off x="18211800" y="9372600"/>
             <a:ext cx="457200" cy="152400"/>
           </a:xfrm>
           <a:prstGeom prst="rect">
@@ -6204,7 +6204,7 @@
         </p:nvSpPr>
         <p:spPr>
           <a:xfrm>
-            <a:off x="16764000" y="7467600"/>
+            <a:off x="18211800" y="7467600"/>
             <a:ext cx="1219200" cy="2286000"/>
           </a:xfrm>
           <a:prstGeom prst="rect">
@@ -6266,7 +6266,7 @@
         </p:nvCxnSpPr>
         <p:spPr>
           <a:xfrm>
-            <a:off x="16764000" y="9144000"/>
+            <a:off x="18211800" y="9144000"/>
             <a:ext cx="76200" cy="76200"/>
           </a:xfrm>
           <a:prstGeom prst="line">
@@ -6301,7 +6301,7 @@
         </p:nvCxnSpPr>
         <p:spPr>
           <a:xfrm flipH="1">
-            <a:off x="16764000" y="9220200"/>
+            <a:off x="18211800" y="9220200"/>
             <a:ext cx="76200" cy="76200"/>
           </a:xfrm>
           <a:prstGeom prst="line">
@@ -6336,7 +6336,7 @@
         </p:nvCxnSpPr>
         <p:spPr>
           <a:xfrm flipH="1">
-            <a:off x="17907000" y="9144000"/>
+            <a:off x="19354800" y="9144000"/>
             <a:ext cx="76200" cy="76200"/>
           </a:xfrm>
           <a:prstGeom prst="line">
@@ -6371,7 +6371,7 @@
         </p:nvCxnSpPr>
         <p:spPr>
           <a:xfrm>
-            <a:off x="17907000" y="9220200"/>
+            <a:off x="19354800" y="9220200"/>
             <a:ext cx="76200" cy="76200"/>
           </a:xfrm>
           <a:prstGeom prst="line">
@@ -6406,7 +6406,7 @@
         </p:nvSpPr>
         <p:spPr>
           <a:xfrm>
-            <a:off x="16764000" y="8153400"/>
+            <a:off x="18211800" y="8153400"/>
             <a:ext cx="457200" cy="152400"/>
           </a:xfrm>
           <a:prstGeom prst="rect">
@@ -6458,7 +6458,7 @@
         </p:nvSpPr>
         <p:spPr>
           <a:xfrm>
-            <a:off x="16764000" y="7162800"/>
+            <a:off x="18211800" y="7162800"/>
             <a:ext cx="457200" cy="304800"/>
           </a:xfrm>
           <a:prstGeom prst="rect">
@@ -6529,7 +6529,7 @@
         </p:nvSpPr>
         <p:spPr>
           <a:xfrm>
-            <a:off x="17526000" y="9372600"/>
+            <a:off x="18973800" y="9372600"/>
             <a:ext cx="457200" cy="152400"/>
           </a:xfrm>
           <a:prstGeom prst="rect">
@@ -6582,7 +6582,7 @@
         </p:nvSpPr>
         <p:spPr>
           <a:xfrm>
-            <a:off x="20269200" y="8153400"/>
+            <a:off x="22021800" y="8153400"/>
             <a:ext cx="457200" cy="152400"/>
           </a:xfrm>
           <a:prstGeom prst="rect">
@@ -6635,7 +6635,7 @@
         </p:nvSpPr>
         <p:spPr>
           <a:xfrm>
-            <a:off x="19507200" y="9067800"/>
+            <a:off x="21259800" y="9067800"/>
             <a:ext cx="457200" cy="152400"/>
           </a:xfrm>
           <a:prstGeom prst="rect">
@@ -6687,7 +6687,7 @@
         </p:nvSpPr>
         <p:spPr>
           <a:xfrm>
-            <a:off x="19507200" y="9372600"/>
+            <a:off x="21259800" y="9372600"/>
             <a:ext cx="457200" cy="152400"/>
           </a:xfrm>
           <a:prstGeom prst="rect">
@@ -6739,7 +6739,7 @@
         </p:nvSpPr>
         <p:spPr>
           <a:xfrm>
-            <a:off x="19507200" y="7467600"/>
+            <a:off x="21259800" y="7467600"/>
             <a:ext cx="1219200" cy="2286000"/>
           </a:xfrm>
           <a:prstGeom prst="rect">
@@ -6801,7 +6801,7 @@
         </p:nvCxnSpPr>
         <p:spPr>
           <a:xfrm>
-            <a:off x="19507200" y="9144000"/>
+            <a:off x="21259800" y="9144000"/>
             <a:ext cx="76200" cy="76200"/>
           </a:xfrm>
           <a:prstGeom prst="line">
@@ -6836,7 +6836,7 @@
         </p:nvCxnSpPr>
         <p:spPr>
           <a:xfrm flipH="1">
-            <a:off x="19507200" y="9220200"/>
+            <a:off x="21259800" y="9220200"/>
             <a:ext cx="76200" cy="76200"/>
           </a:xfrm>
           <a:prstGeom prst="line">
@@ -6871,7 +6871,7 @@
         </p:nvSpPr>
         <p:spPr>
           <a:xfrm>
-            <a:off x="19507200" y="8153400"/>
+            <a:off x="21259800" y="8001000"/>
             <a:ext cx="457200" cy="152400"/>
           </a:xfrm>
           <a:prstGeom prst="rect">
@@ -6923,7 +6923,7 @@
         </p:nvSpPr>
         <p:spPr>
           <a:xfrm>
-            <a:off x="19507200" y="7315200"/>
+            <a:off x="21259800" y="7315200"/>
             <a:ext cx="457200" cy="152400"/>
           </a:xfrm>
           <a:prstGeom prst="rect">
@@ -6982,7 +6982,7 @@
         </p:nvSpPr>
         <p:spPr>
           <a:xfrm>
-            <a:off x="19507200" y="8458200"/>
+            <a:off x="21259800" y="8458200"/>
             <a:ext cx="457200" cy="152400"/>
           </a:xfrm>
           <a:prstGeom prst="rect">
@@ -7034,7 +7034,7 @@
         </p:nvSpPr>
         <p:spPr>
           <a:xfrm>
-            <a:off x="19507200" y="7848600"/>
+            <a:off x="21259800" y="7696200"/>
             <a:ext cx="457200" cy="152400"/>
           </a:xfrm>
           <a:prstGeom prst="rect">
@@ -7086,7 +7086,7 @@
         </p:nvSpPr>
         <p:spPr>
           <a:xfrm>
-            <a:off x="20269200" y="8458200"/>
+            <a:off x="22021800" y="8458200"/>
             <a:ext cx="457200" cy="152400"/>
           </a:xfrm>
           <a:prstGeom prst="rect">
@@ -7139,7 +7139,7 @@
         </p:nvSpPr>
         <p:spPr>
           <a:xfrm>
-            <a:off x="20269200" y="8763000"/>
+            <a:off x="22021800" y="8763000"/>
             <a:ext cx="457200" cy="152400"/>
           </a:xfrm>
           <a:prstGeom prst="rect">
@@ -7192,7 +7192,7 @@
         </p:nvSpPr>
         <p:spPr>
           <a:xfrm>
-            <a:off x="23012400" y="8153400"/>
+            <a:off x="24765000" y="8153400"/>
             <a:ext cx="457200" cy="152400"/>
           </a:xfrm>
           <a:prstGeom prst="rect">
@@ -7245,7 +7245,7 @@
         </p:nvSpPr>
         <p:spPr>
           <a:xfrm>
-            <a:off x="22250400" y="9677400"/>
+            <a:off x="24003000" y="9677400"/>
             <a:ext cx="457200" cy="152400"/>
           </a:xfrm>
           <a:prstGeom prst="rect">
@@ -7297,7 +7297,7 @@
         </p:nvSpPr>
         <p:spPr>
           <a:xfrm>
-            <a:off x="22250400" y="10058400"/>
+            <a:off x="24003000" y="10058400"/>
             <a:ext cx="457200" cy="152400"/>
           </a:xfrm>
           <a:prstGeom prst="rect">
@@ -7349,7 +7349,7 @@
         </p:nvSpPr>
         <p:spPr>
           <a:xfrm>
-            <a:off x="22250400" y="7239000"/>
+            <a:off x="24003000" y="7239000"/>
             <a:ext cx="1219200" cy="3124200"/>
           </a:xfrm>
           <a:prstGeom prst="rect">
@@ -7411,7 +7411,7 @@
         </p:nvCxnSpPr>
         <p:spPr>
           <a:xfrm>
-            <a:off x="22250400" y="9753600"/>
+            <a:off x="24003000" y="9753600"/>
             <a:ext cx="76200" cy="76200"/>
           </a:xfrm>
           <a:prstGeom prst="line">
@@ -7446,7 +7446,7 @@
         </p:nvCxnSpPr>
         <p:spPr>
           <a:xfrm flipH="1">
-            <a:off x="22250400" y="9829800"/>
+            <a:off x="24003000" y="9829800"/>
             <a:ext cx="76200" cy="76200"/>
           </a:xfrm>
           <a:prstGeom prst="line">
@@ -7481,7 +7481,7 @@
         </p:nvSpPr>
         <p:spPr>
           <a:xfrm>
-            <a:off x="22250400" y="8153400"/>
+            <a:off x="24003000" y="8153400"/>
             <a:ext cx="457200" cy="152400"/>
           </a:xfrm>
           <a:prstGeom prst="rect">
@@ -7533,7 +7533,7 @@
         </p:nvSpPr>
         <p:spPr>
           <a:xfrm>
-            <a:off x="22250400" y="7086600"/>
+            <a:off x="24003000" y="7086600"/>
             <a:ext cx="457200" cy="152400"/>
           </a:xfrm>
           <a:prstGeom prst="rect">
@@ -7592,7 +7592,7 @@
         </p:nvSpPr>
         <p:spPr>
           <a:xfrm>
-            <a:off x="22250400" y="8458200"/>
+            <a:off x="24003000" y="8458200"/>
             <a:ext cx="457200" cy="152400"/>
           </a:xfrm>
           <a:prstGeom prst="rect">
@@ -7644,7 +7644,7 @@
         </p:nvSpPr>
         <p:spPr>
           <a:xfrm>
-            <a:off x="22250400" y="7848600"/>
+            <a:off x="24003000" y="7848600"/>
             <a:ext cx="457200" cy="152400"/>
           </a:xfrm>
           <a:prstGeom prst="rect">
@@ -7696,7 +7696,7 @@
         </p:nvSpPr>
         <p:spPr>
           <a:xfrm>
-            <a:off x="22250400" y="8763000"/>
+            <a:off x="24003000" y="8763000"/>
             <a:ext cx="457200" cy="152400"/>
           </a:xfrm>
           <a:prstGeom prst="rect">
@@ -7748,7 +7748,7 @@
         </p:nvSpPr>
         <p:spPr>
           <a:xfrm>
-            <a:off x="22250400" y="7543800"/>
+            <a:off x="24003000" y="7543800"/>
             <a:ext cx="457200" cy="152400"/>
           </a:xfrm>
           <a:prstGeom prst="rect">
@@ -7800,7 +7800,7 @@
         </p:nvCxnSpPr>
         <p:spPr>
           <a:xfrm flipV="1">
-            <a:off x="11963400" y="8153396"/>
+            <a:off x="13411200" y="8153396"/>
             <a:ext cx="152400" cy="152404"/>
           </a:xfrm>
           <a:prstGeom prst="line">
@@ -7837,7 +7837,7 @@
         </p:nvSpPr>
         <p:spPr>
           <a:xfrm>
-            <a:off x="11963401" y="8077196"/>
+            <a:off x="13411201" y="8077196"/>
             <a:ext cx="152400" cy="76200"/>
           </a:xfrm>
           <a:prstGeom prst="rect">
@@ -7890,7 +7890,7 @@
         </p:nvSpPr>
         <p:spPr>
           <a:xfrm>
-            <a:off x="12192000" y="8153396"/>
+            <a:off x="13639800" y="8153396"/>
             <a:ext cx="228600" cy="152400"/>
           </a:xfrm>
           <a:prstGeom prst="homePlate">
@@ -7944,7 +7944,7 @@
         </p:nvCxnSpPr>
         <p:spPr>
           <a:xfrm flipV="1">
-            <a:off x="11277600" y="8229596"/>
+            <a:off x="12725400" y="8229596"/>
             <a:ext cx="914400" cy="4"/>
           </a:xfrm>
           <a:prstGeom prst="line">
@@ -7981,7 +7981,7 @@
         </p:nvSpPr>
         <p:spPr>
           <a:xfrm>
-            <a:off x="11430000" y="8077196"/>
+            <a:off x="12877800" y="8077196"/>
             <a:ext cx="457200" cy="152400"/>
           </a:xfrm>
           <a:prstGeom prst="rect">
@@ -8033,7 +8033,7 @@
         </p:nvSpPr>
         <p:spPr>
           <a:xfrm>
-            <a:off x="12877800" y="8153400"/>
+            <a:off x="14325600" y="8153400"/>
             <a:ext cx="228600" cy="152400"/>
           </a:xfrm>
           <a:prstGeom prst="homePlate">
@@ -8084,7 +8084,7 @@
         </p:nvCxnSpPr>
         <p:spPr>
           <a:xfrm flipV="1">
-            <a:off x="13106400" y="8229600"/>
+            <a:off x="14554200" y="8229600"/>
             <a:ext cx="914400" cy="4"/>
           </a:xfrm>
           <a:prstGeom prst="line">
@@ -8121,7 +8121,7 @@
         </p:nvCxnSpPr>
         <p:spPr>
           <a:xfrm flipV="1">
-            <a:off x="13182600" y="8153400"/>
+            <a:off x="14630400" y="8153400"/>
             <a:ext cx="152400" cy="152404"/>
           </a:xfrm>
           <a:prstGeom prst="line">
@@ -8158,7 +8158,7 @@
         </p:nvSpPr>
         <p:spPr>
           <a:xfrm>
-            <a:off x="13182601" y="8077200"/>
+            <a:off x="14630401" y="8077200"/>
             <a:ext cx="152400" cy="76200"/>
           </a:xfrm>
           <a:prstGeom prst="rect">
@@ -8211,7 +8211,7 @@
         </p:nvSpPr>
         <p:spPr>
           <a:xfrm>
-            <a:off x="13411200" y="8077200"/>
+            <a:off x="14859000" y="8077200"/>
             <a:ext cx="457200" cy="152400"/>
           </a:xfrm>
           <a:prstGeom prst="rect">
@@ -8263,7 +8263,7 @@
         </p:nvSpPr>
         <p:spPr>
           <a:xfrm>
-            <a:off x="5334000" y="6858000"/>
+            <a:off x="5562600" y="6858000"/>
             <a:ext cx="457200" cy="152400"/>
           </a:xfrm>
           <a:prstGeom prst="rect">
@@ -8315,9 +8315,9 @@
           <p:nvPr/>
         </p:nvCxnSpPr>
         <p:spPr>
-          <a:xfrm flipV="1">
-            <a:off x="5791200" y="8229600"/>
-            <a:ext cx="1524000" cy="4"/>
+          <a:xfrm>
+            <a:off x="8534400" y="7924800"/>
+            <a:ext cx="228600" cy="0"/>
           </a:xfrm>
           <a:prstGeom prst="line">
             <a:avLst/>
@@ -8352,9 +8352,9 @@
           <p:nvPr/>
         </p:nvCxnSpPr>
         <p:spPr>
-          <a:xfrm flipV="1">
-            <a:off x="5791200" y="8534400"/>
-            <a:ext cx="1524000" cy="4"/>
+          <a:xfrm>
+            <a:off x="6019800" y="8534400"/>
+            <a:ext cx="2743200" cy="0"/>
           </a:xfrm>
           <a:prstGeom prst="line">
             <a:avLst/>
@@ -8391,9 +8391,9 @@
           <p:nvPr/>
         </p:nvCxnSpPr>
         <p:spPr>
-          <a:xfrm flipH="1" flipV="1">
-            <a:off x="5791200" y="8839200"/>
-            <a:ext cx="1524000" cy="4"/>
+          <a:xfrm flipH="1">
+            <a:off x="6019800" y="8839200"/>
+            <a:ext cx="2743200" cy="0"/>
           </a:xfrm>
           <a:prstGeom prst="line">
             <a:avLst/>
@@ -8429,7 +8429,7 @@
         </p:nvCxnSpPr>
         <p:spPr>
           <a:xfrm flipV="1">
-            <a:off x="8534400" y="8229600"/>
+            <a:off x="9982200" y="8229600"/>
             <a:ext cx="1524000" cy="4"/>
           </a:xfrm>
           <a:prstGeom prst="line">
@@ -8466,7 +8466,7 @@
         </p:nvCxnSpPr>
         <p:spPr>
           <a:xfrm flipH="1">
-            <a:off x="8534400" y="8839200"/>
+            <a:off x="9982200" y="8839200"/>
             <a:ext cx="304800" cy="0"/>
           </a:xfrm>
           <a:prstGeom prst="line">
@@ -8503,7 +8503,7 @@
         </p:nvSpPr>
         <p:spPr>
           <a:xfrm>
-            <a:off x="8686800" y="8686800"/>
+            <a:off x="10134600" y="8686800"/>
             <a:ext cx="457200" cy="152400"/>
           </a:xfrm>
           <a:prstGeom prst="rect">
@@ -8555,7 +8555,7 @@
         </p:nvCxnSpPr>
         <p:spPr>
           <a:xfrm>
-            <a:off x="8534400" y="8534404"/>
+            <a:off x="9982200" y="8534404"/>
             <a:ext cx="304800" cy="0"/>
           </a:xfrm>
           <a:prstGeom prst="line">
@@ -8592,7 +8592,7 @@
         </p:nvCxnSpPr>
         <p:spPr>
           <a:xfrm flipV="1">
-            <a:off x="8763000" y="8458200"/>
+            <a:off x="10210800" y="8458200"/>
             <a:ext cx="152400" cy="152404"/>
           </a:xfrm>
           <a:prstGeom prst="line">
@@ -8629,7 +8629,7 @@
         </p:nvCxnSpPr>
         <p:spPr>
           <a:xfrm>
-            <a:off x="8763000" y="8458200"/>
+            <a:off x="10210800" y="8458200"/>
             <a:ext cx="152400" cy="152400"/>
           </a:xfrm>
           <a:prstGeom prst="line">
@@ -8666,7 +8666,7 @@
         </p:nvCxnSpPr>
         <p:spPr>
           <a:xfrm flipV="1">
-            <a:off x="15240000" y="8229600"/>
+            <a:off x="16687800" y="8229600"/>
             <a:ext cx="1524000" cy="4"/>
           </a:xfrm>
           <a:prstGeom prst="line">
@@ -8703,7 +8703,7 @@
         </p:nvCxnSpPr>
         <p:spPr>
           <a:xfrm flipV="1">
-            <a:off x="5943599" y="8153400"/>
+            <a:off x="6172199" y="8153400"/>
             <a:ext cx="152400" cy="152404"/>
           </a:xfrm>
           <a:prstGeom prst="line">
@@ -8740,7 +8740,7 @@
         </p:nvSpPr>
         <p:spPr>
           <a:xfrm>
-            <a:off x="5943600" y="8077200"/>
+            <a:off x="6172200" y="8077200"/>
             <a:ext cx="152400" cy="76200"/>
           </a:xfrm>
           <a:prstGeom prst="rect">
@@ -8793,7 +8793,7 @@
         </p:nvCxnSpPr>
         <p:spPr>
           <a:xfrm flipV="1">
-            <a:off x="5943600" y="8458196"/>
+            <a:off x="6172200" y="8458196"/>
             <a:ext cx="152400" cy="152404"/>
           </a:xfrm>
           <a:prstGeom prst="line">
@@ -8830,7 +8830,7 @@
         </p:nvSpPr>
         <p:spPr>
           <a:xfrm>
-            <a:off x="5943601" y="8381996"/>
+            <a:off x="6172201" y="8381996"/>
             <a:ext cx="152400" cy="76200"/>
           </a:xfrm>
           <a:prstGeom prst="rect">
@@ -8883,7 +8883,7 @@
         </p:nvCxnSpPr>
         <p:spPr>
           <a:xfrm flipV="1">
-            <a:off x="5943600" y="8762996"/>
+            <a:off x="6172200" y="8762996"/>
             <a:ext cx="152400" cy="152404"/>
           </a:xfrm>
           <a:prstGeom prst="line">
@@ -8920,7 +8920,7 @@
         </p:nvSpPr>
         <p:spPr>
           <a:xfrm>
-            <a:off x="5943601" y="8686796"/>
+            <a:off x="6172201" y="8686796"/>
             <a:ext cx="152400" cy="76200"/>
           </a:xfrm>
           <a:prstGeom prst="rect">
@@ -8973,7 +8973,7 @@
         </p:nvCxnSpPr>
         <p:spPr>
           <a:xfrm flipV="1">
-            <a:off x="8686800" y="8153400"/>
+            <a:off x="10134600" y="8153400"/>
             <a:ext cx="152400" cy="152404"/>
           </a:xfrm>
           <a:prstGeom prst="line">
@@ -9010,7 +9010,7 @@
         </p:nvSpPr>
         <p:spPr>
           <a:xfrm>
-            <a:off x="8686801" y="8077200"/>
+            <a:off x="10134601" y="8077200"/>
             <a:ext cx="152400" cy="76200"/>
           </a:xfrm>
           <a:prstGeom prst="rect">
@@ -9063,7 +9063,7 @@
         </p:nvCxnSpPr>
         <p:spPr>
           <a:xfrm>
-            <a:off x="16459200" y="8534400"/>
+            <a:off x="17907000" y="8534400"/>
             <a:ext cx="304800" cy="0"/>
           </a:xfrm>
           <a:prstGeom prst="line">
@@ -9100,7 +9100,7 @@
         </p:nvSpPr>
         <p:spPr>
           <a:xfrm>
-            <a:off x="16154400" y="8382000"/>
+            <a:off x="17602200" y="8382000"/>
             <a:ext cx="457200" cy="152400"/>
           </a:xfrm>
           <a:prstGeom prst="rect">
@@ -9153,7 +9153,7 @@
         </p:nvCxnSpPr>
         <p:spPr>
           <a:xfrm flipH="1">
-            <a:off x="16459200" y="8839200"/>
+            <a:off x="17907000" y="8839200"/>
             <a:ext cx="304800" cy="0"/>
           </a:xfrm>
           <a:prstGeom prst="line">
@@ -9190,7 +9190,7 @@
         </p:nvCxnSpPr>
         <p:spPr>
           <a:xfrm flipV="1">
-            <a:off x="16383000" y="8763000"/>
+            <a:off x="17830800" y="8763000"/>
             <a:ext cx="152400" cy="152404"/>
           </a:xfrm>
           <a:prstGeom prst="line">
@@ -9227,7 +9227,7 @@
         </p:nvCxnSpPr>
         <p:spPr>
           <a:xfrm>
-            <a:off x="16383000" y="8763000"/>
+            <a:off x="17830800" y="8763000"/>
             <a:ext cx="152400" cy="152400"/>
           </a:xfrm>
           <a:prstGeom prst="line">
@@ -9264,7 +9264,7 @@
         </p:nvCxnSpPr>
         <p:spPr>
           <a:xfrm flipV="1">
-            <a:off x="15392400" y="8153400"/>
+            <a:off x="16840200" y="8153400"/>
             <a:ext cx="152400" cy="152404"/>
           </a:xfrm>
           <a:prstGeom prst="line">
@@ -9301,7 +9301,7 @@
         </p:nvSpPr>
         <p:spPr>
           <a:xfrm>
-            <a:off x="15392401" y="8077200"/>
+            <a:off x="16840201" y="8077200"/>
             <a:ext cx="152400" cy="76200"/>
           </a:xfrm>
           <a:prstGeom prst="rect">
@@ -9354,7 +9354,7 @@
         </p:nvCxnSpPr>
         <p:spPr>
           <a:xfrm>
-            <a:off x="4267200" y="6934200"/>
+            <a:off x="4495800" y="6934200"/>
             <a:ext cx="304800" cy="0"/>
           </a:xfrm>
           <a:prstGeom prst="line">
@@ -9386,13 +9386,16 @@
       <p:cxnSp>
         <p:nvCxnSpPr>
           <p:cNvPr id="285" name="Straight Connector 284"/>
-          <p:cNvCxnSpPr/>
+          <p:cNvCxnSpPr>
+            <a:stCxn id="456" idx="0"/>
+            <a:endCxn id="227" idx="1"/>
+          </p:cNvCxnSpPr>
           <p:nvPr/>
         </p:nvCxnSpPr>
         <p:spPr>
-          <a:xfrm flipV="1">
-            <a:off x="17983200" y="8229600"/>
-            <a:ext cx="1524000" cy="4"/>
+          <a:xfrm>
+            <a:off x="20650200" y="8077200"/>
+            <a:ext cx="609600" cy="0"/>
           </a:xfrm>
           <a:prstGeom prst="line">
             <a:avLst/>
@@ -9423,13 +9426,15 @@
       <p:cxnSp>
         <p:nvCxnSpPr>
           <p:cNvPr id="286" name="Straight Connector 285"/>
-          <p:cNvCxnSpPr/>
+          <p:cNvCxnSpPr>
+            <a:endCxn id="229" idx="1"/>
+          </p:cNvCxnSpPr>
           <p:nvPr/>
         </p:nvCxnSpPr>
         <p:spPr>
           <a:xfrm flipV="1">
-            <a:off x="17983200" y="8534400"/>
-            <a:ext cx="1524000" cy="4"/>
+            <a:off x="19431000" y="8534400"/>
+            <a:ext cx="1828800" cy="4"/>
           </a:xfrm>
           <a:prstGeom prst="line">
             <a:avLst/>
@@ -9465,7 +9470,7 @@
         </p:nvCxnSpPr>
         <p:spPr>
           <a:xfrm flipH="1">
-            <a:off x="17983200" y="8839200"/>
+            <a:off x="19431000" y="8839200"/>
             <a:ext cx="304800" cy="0"/>
           </a:xfrm>
           <a:prstGeom prst="line">
@@ -9502,7 +9507,7 @@
         </p:nvCxnSpPr>
         <p:spPr>
           <a:xfrm flipV="1">
-            <a:off x="18135599" y="8153400"/>
+            <a:off x="19583399" y="8153400"/>
             <a:ext cx="152400" cy="152404"/>
           </a:xfrm>
           <a:prstGeom prst="line">
@@ -9539,7 +9544,7 @@
         </p:nvSpPr>
         <p:spPr>
           <a:xfrm>
-            <a:off x="18135600" y="8077200"/>
+            <a:off x="19583400" y="8077200"/>
             <a:ext cx="152400" cy="76200"/>
           </a:xfrm>
           <a:prstGeom prst="rect">
@@ -9592,7 +9597,7 @@
         </p:nvCxnSpPr>
         <p:spPr>
           <a:xfrm flipV="1">
-            <a:off x="18135600" y="8458196"/>
+            <a:off x="19583400" y="8458196"/>
             <a:ext cx="152400" cy="152404"/>
           </a:xfrm>
           <a:prstGeom prst="line">
@@ -9629,7 +9634,7 @@
         </p:nvSpPr>
         <p:spPr>
           <a:xfrm>
-            <a:off x="18135601" y="8381996"/>
+            <a:off x="19583401" y="8381996"/>
             <a:ext cx="152400" cy="76200"/>
           </a:xfrm>
           <a:prstGeom prst="rect">
@@ -9682,7 +9687,7 @@
         </p:nvCxnSpPr>
         <p:spPr>
           <a:xfrm flipV="1">
-            <a:off x="20726400" y="8229600"/>
+            <a:off x="22479000" y="8229600"/>
             <a:ext cx="1524000" cy="4"/>
           </a:xfrm>
           <a:prstGeom prst="line">
@@ -9719,7 +9724,7 @@
         </p:nvCxnSpPr>
         <p:spPr>
           <a:xfrm flipV="1">
-            <a:off x="20726400" y="8534400"/>
+            <a:off x="22479000" y="8534400"/>
             <a:ext cx="1524000" cy="4"/>
           </a:xfrm>
           <a:prstGeom prst="line">
@@ -9756,7 +9761,7 @@
         </p:nvCxnSpPr>
         <p:spPr>
           <a:xfrm flipV="1">
-            <a:off x="20878799" y="8153400"/>
+            <a:off x="22631399" y="8153400"/>
             <a:ext cx="152400" cy="152404"/>
           </a:xfrm>
           <a:prstGeom prst="line">
@@ -9793,7 +9798,7 @@
         </p:nvSpPr>
         <p:spPr>
           <a:xfrm>
-            <a:off x="20878800" y="8077200"/>
+            <a:off x="22631400" y="8077200"/>
             <a:ext cx="152400" cy="76200"/>
           </a:xfrm>
           <a:prstGeom prst="rect">
@@ -9853,7 +9858,7 @@
         </p:nvCxnSpPr>
         <p:spPr>
           <a:xfrm flipV="1">
-            <a:off x="20878800" y="8458196"/>
+            <a:off x="22631400" y="8458196"/>
             <a:ext cx="152400" cy="152404"/>
           </a:xfrm>
           <a:prstGeom prst="line">
@@ -9890,7 +9895,7 @@
         </p:nvSpPr>
         <p:spPr>
           <a:xfrm>
-            <a:off x="20878801" y="8381996"/>
+            <a:off x="22631401" y="8381996"/>
             <a:ext cx="152400" cy="76200"/>
           </a:xfrm>
           <a:prstGeom prst="rect">
@@ -9943,7 +9948,7 @@
         </p:nvCxnSpPr>
         <p:spPr>
           <a:xfrm flipV="1">
-            <a:off x="20726400" y="8839200"/>
+            <a:off x="22479000" y="8839200"/>
             <a:ext cx="1524000" cy="4"/>
           </a:xfrm>
           <a:prstGeom prst="line">
@@ -9980,7 +9985,7 @@
         </p:nvCxnSpPr>
         <p:spPr>
           <a:xfrm flipV="1">
-            <a:off x="20878800" y="8762996"/>
+            <a:off x="22631400" y="8762996"/>
             <a:ext cx="152400" cy="152404"/>
           </a:xfrm>
           <a:prstGeom prst="line">
@@ -10017,7 +10022,7 @@
         </p:nvSpPr>
         <p:spPr>
           <a:xfrm>
-            <a:off x="20878801" y="8686796"/>
+            <a:off x="22631401" y="8686796"/>
             <a:ext cx="152400" cy="76200"/>
           </a:xfrm>
           <a:prstGeom prst="rect">
@@ -10070,7 +10075,7 @@
         </p:nvSpPr>
         <p:spPr>
           <a:xfrm>
-            <a:off x="10058400" y="9372600"/>
+            <a:off x="11506200" y="9372600"/>
             <a:ext cx="457200" cy="152400"/>
           </a:xfrm>
           <a:prstGeom prst="rect">
@@ -10122,7 +10127,7 @@
         </p:nvSpPr>
         <p:spPr>
           <a:xfrm>
-            <a:off x="14020800" y="9067800"/>
+            <a:off x="15468600" y="9067800"/>
             <a:ext cx="457200" cy="152400"/>
           </a:xfrm>
           <a:prstGeom prst="rect">
@@ -10174,7 +10179,7 @@
         </p:nvSpPr>
         <p:spPr>
           <a:xfrm>
-            <a:off x="14020800" y="9372600"/>
+            <a:off x="15468600" y="9372600"/>
             <a:ext cx="457200" cy="152400"/>
           </a:xfrm>
           <a:prstGeom prst="rect">
@@ -10226,7 +10231,7 @@
         </p:nvCxnSpPr>
         <p:spPr>
           <a:xfrm>
-            <a:off x="14020800" y="9144000"/>
+            <a:off x="15468600" y="9144000"/>
             <a:ext cx="76200" cy="76200"/>
           </a:xfrm>
           <a:prstGeom prst="line">
@@ -10261,7 +10266,7 @@
         </p:nvCxnSpPr>
         <p:spPr>
           <a:xfrm flipH="1">
-            <a:off x="14020800" y="9220200"/>
+            <a:off x="15468600" y="9220200"/>
             <a:ext cx="76200" cy="76200"/>
           </a:xfrm>
           <a:prstGeom prst="line">
@@ -10296,7 +10301,7 @@
         </p:nvCxnSpPr>
         <p:spPr>
           <a:xfrm flipH="1">
-            <a:off x="11201400" y="9144000"/>
+            <a:off x="12649200" y="9144000"/>
             <a:ext cx="76200" cy="76200"/>
           </a:xfrm>
           <a:prstGeom prst="line">
@@ -10331,7 +10336,7 @@
         </p:nvCxnSpPr>
         <p:spPr>
           <a:xfrm>
-            <a:off x="11201400" y="9220200"/>
+            <a:off x="12649200" y="9220200"/>
             <a:ext cx="76200" cy="76200"/>
           </a:xfrm>
           <a:prstGeom prst="line">
@@ -10366,7 +10371,7 @@
         </p:nvCxnSpPr>
         <p:spPr>
           <a:xfrm>
-            <a:off x="11277600" y="9220204"/>
+            <a:off x="12725400" y="9220204"/>
             <a:ext cx="2743200" cy="0"/>
           </a:xfrm>
           <a:prstGeom prst="line">
@@ -10403,7 +10408,7 @@
         </p:nvCxnSpPr>
         <p:spPr>
           <a:xfrm>
-            <a:off x="11277600" y="9448800"/>
+            <a:off x="12725400" y="9448800"/>
             <a:ext cx="2743200" cy="0"/>
           </a:xfrm>
           <a:prstGeom prst="line">
@@ -10440,7 +10445,7 @@
         </p:nvCxnSpPr>
         <p:spPr>
           <a:xfrm>
-            <a:off x="12801600" y="9448800"/>
+            <a:off x="14249400" y="9448800"/>
             <a:ext cx="0" cy="2133600"/>
           </a:xfrm>
           <a:prstGeom prst="line">
@@ -10477,7 +10482,7 @@
         </p:nvCxnSpPr>
         <p:spPr>
           <a:xfrm flipV="1">
-            <a:off x="609600" y="11506196"/>
+            <a:off x="838200" y="11506196"/>
             <a:ext cx="152400" cy="152404"/>
           </a:xfrm>
           <a:prstGeom prst="line">
@@ -10514,7 +10519,7 @@
         </p:nvSpPr>
         <p:spPr>
           <a:xfrm>
-            <a:off x="914400" y="11429996"/>
+            <a:off x="1143000" y="11429996"/>
             <a:ext cx="457200" cy="152400"/>
           </a:xfrm>
           <a:prstGeom prst="rect">
@@ -10566,7 +10571,7 @@
         </p:nvSpPr>
         <p:spPr>
           <a:xfrm>
-            <a:off x="609601" y="11429996"/>
+            <a:off x="838201" y="11429996"/>
             <a:ext cx="152400" cy="76200"/>
           </a:xfrm>
           <a:prstGeom prst="rect">
@@ -10619,7 +10624,7 @@
         </p:nvSpPr>
         <p:spPr>
           <a:xfrm>
-            <a:off x="304800" y="11506196"/>
+            <a:off x="533400" y="11506196"/>
             <a:ext cx="228600" cy="152400"/>
           </a:xfrm>
           <a:prstGeom prst="homePlate">
@@ -10672,8 +10677,8 @@
         </p:nvCxnSpPr>
         <p:spPr>
           <a:xfrm>
-            <a:off x="533400" y="11582396"/>
-            <a:ext cx="12268200" cy="0"/>
+            <a:off x="762000" y="11582396"/>
+            <a:ext cx="13487400" cy="0"/>
           </a:xfrm>
           <a:prstGeom prst="line">
             <a:avLst/>
@@ -10709,7 +10714,7 @@
         </p:nvCxnSpPr>
         <p:spPr>
           <a:xfrm>
-            <a:off x="8534400" y="9220200"/>
+            <a:off x="9982200" y="9220200"/>
             <a:ext cx="1524000" cy="0"/>
           </a:xfrm>
           <a:prstGeom prst="line">
@@ -10746,7 +10751,7 @@
         </p:nvCxnSpPr>
         <p:spPr>
           <a:xfrm>
-            <a:off x="8534400" y="9448800"/>
+            <a:off x="9982200" y="9448800"/>
             <a:ext cx="1524000" cy="0"/>
           </a:xfrm>
           <a:prstGeom prst="line">
@@ -10783,7 +10788,7 @@
         </p:nvCxnSpPr>
         <p:spPr>
           <a:xfrm>
-            <a:off x="9144000" y="9220200"/>
+            <a:off x="10591800" y="9220200"/>
             <a:ext cx="0" cy="2667000"/>
           </a:xfrm>
           <a:prstGeom prst="line">
@@ -10820,7 +10825,7 @@
         </p:nvCxnSpPr>
         <p:spPr>
           <a:xfrm>
-            <a:off x="9448800" y="9448800"/>
+            <a:off x="10896600" y="9448800"/>
             <a:ext cx="0" cy="2743200"/>
           </a:xfrm>
           <a:prstGeom prst="line">
@@ -10857,7 +10862,7 @@
         </p:nvCxnSpPr>
         <p:spPr>
           <a:xfrm flipV="1">
-            <a:off x="609600" y="11811000"/>
+            <a:off x="838200" y="11811000"/>
             <a:ext cx="152400" cy="152404"/>
           </a:xfrm>
           <a:prstGeom prst="line">
@@ -10894,7 +10899,7 @@
         </p:nvSpPr>
         <p:spPr>
           <a:xfrm>
-            <a:off x="914400" y="11734800"/>
+            <a:off x="1143000" y="11734800"/>
             <a:ext cx="457200" cy="152400"/>
           </a:xfrm>
           <a:prstGeom prst="rect">
@@ -10946,7 +10951,7 @@
         </p:nvSpPr>
         <p:spPr>
           <a:xfrm>
-            <a:off x="609601" y="11734800"/>
+            <a:off x="838201" y="11734800"/>
             <a:ext cx="152400" cy="76200"/>
           </a:xfrm>
           <a:prstGeom prst="rect">
@@ -10999,7 +11004,7 @@
         </p:nvSpPr>
         <p:spPr>
           <a:xfrm>
-            <a:off x="304800" y="11811000"/>
+            <a:off x="533400" y="11811000"/>
             <a:ext cx="228600" cy="152400"/>
           </a:xfrm>
           <a:prstGeom prst="homePlate">
@@ -11052,8 +11057,8 @@
         </p:nvCxnSpPr>
         <p:spPr>
           <a:xfrm>
-            <a:off x="533400" y="11887200"/>
-            <a:ext cx="15316200" cy="0"/>
+            <a:off x="762000" y="11887200"/>
+            <a:ext cx="16535400" cy="0"/>
           </a:xfrm>
           <a:prstGeom prst="line">
             <a:avLst/>
@@ -11089,7 +11094,7 @@
         </p:nvCxnSpPr>
         <p:spPr>
           <a:xfrm flipV="1">
-            <a:off x="609600" y="12115800"/>
+            <a:off x="838200" y="12115800"/>
             <a:ext cx="152400" cy="152404"/>
           </a:xfrm>
           <a:prstGeom prst="line">
@@ -11126,7 +11131,7 @@
         </p:nvSpPr>
         <p:spPr>
           <a:xfrm>
-            <a:off x="914400" y="12039600"/>
+            <a:off x="1143000" y="12039600"/>
             <a:ext cx="457200" cy="152400"/>
           </a:xfrm>
           <a:prstGeom prst="rect">
@@ -11178,7 +11183,7 @@
         </p:nvSpPr>
         <p:spPr>
           <a:xfrm>
-            <a:off x="609600" y="12039600"/>
+            <a:off x="838200" y="12039600"/>
             <a:ext cx="152400" cy="76200"/>
           </a:xfrm>
           <a:prstGeom prst="rect">
@@ -11231,7 +11236,7 @@
         </p:nvSpPr>
         <p:spPr>
           <a:xfrm>
-            <a:off x="304800" y="12115800"/>
+            <a:off x="533400" y="12115800"/>
             <a:ext cx="228600" cy="152400"/>
           </a:xfrm>
           <a:prstGeom prst="homePlate">
@@ -11284,8 +11289,8 @@
         </p:nvCxnSpPr>
         <p:spPr>
           <a:xfrm>
-            <a:off x="533400" y="12192000"/>
-            <a:ext cx="15621000" cy="0"/>
+            <a:off x="762000" y="12192000"/>
+            <a:ext cx="16840200" cy="0"/>
           </a:xfrm>
           <a:prstGeom prst="line">
             <a:avLst/>
@@ -11321,7 +11326,7 @@
         </p:nvCxnSpPr>
         <p:spPr>
           <a:xfrm>
-            <a:off x="15240000" y="9220200"/>
+            <a:off x="16687800" y="9220200"/>
             <a:ext cx="1524000" cy="0"/>
           </a:xfrm>
           <a:prstGeom prst="line">
@@ -11358,7 +11363,7 @@
         </p:nvCxnSpPr>
         <p:spPr>
           <a:xfrm>
-            <a:off x="16154400" y="9448800"/>
+            <a:off x="17602200" y="9448800"/>
             <a:ext cx="609600" cy="0"/>
           </a:xfrm>
           <a:prstGeom prst="line">
@@ -11395,7 +11400,7 @@
         </p:nvCxnSpPr>
         <p:spPr>
           <a:xfrm>
-            <a:off x="16154400" y="9448800"/>
+            <a:off x="17602200" y="9448800"/>
             <a:ext cx="0" cy="2743200"/>
           </a:xfrm>
           <a:prstGeom prst="line">
@@ -11432,7 +11437,7 @@
         </p:nvCxnSpPr>
         <p:spPr>
           <a:xfrm>
-            <a:off x="21640800" y="9829800"/>
+            <a:off x="23393400" y="9829800"/>
             <a:ext cx="609600" cy="0"/>
           </a:xfrm>
           <a:prstGeom prst="line">
@@ -11469,7 +11474,7 @@
         </p:nvCxnSpPr>
         <p:spPr>
           <a:xfrm>
-            <a:off x="21945600" y="10134600"/>
+            <a:off x="23698200" y="10134600"/>
             <a:ext cx="304800" cy="0"/>
           </a:xfrm>
           <a:prstGeom prst="line">
@@ -11506,7 +11511,7 @@
         </p:nvCxnSpPr>
         <p:spPr>
           <a:xfrm flipV="1">
-            <a:off x="21640800" y="9829800"/>
+            <a:off x="23393400" y="9829800"/>
             <a:ext cx="0" cy="2667000"/>
           </a:xfrm>
           <a:prstGeom prst="line">
@@ -11543,7 +11548,7 @@
         </p:nvCxnSpPr>
         <p:spPr>
           <a:xfrm flipV="1">
-            <a:off x="21945600" y="10134600"/>
+            <a:off x="23698200" y="10134600"/>
             <a:ext cx="0" cy="2667000"/>
           </a:xfrm>
           <a:prstGeom prst="line">
@@ -11582,8 +11587,8 @@
         </p:nvCxnSpPr>
         <p:spPr>
           <a:xfrm>
-            <a:off x="533400" y="12496796"/>
-            <a:ext cx="21107400" cy="0"/>
+            <a:off x="762000" y="12496796"/>
+            <a:ext cx="22631400" cy="4"/>
           </a:xfrm>
           <a:prstGeom prst="line">
             <a:avLst/>
@@ -11621,8 +11626,8 @@
         </p:nvCxnSpPr>
         <p:spPr>
           <a:xfrm>
-            <a:off x="533400" y="12801596"/>
-            <a:ext cx="21412200" cy="0"/>
+            <a:off x="762000" y="12801596"/>
+            <a:ext cx="22936200" cy="0"/>
           </a:xfrm>
           <a:prstGeom prst="line">
             <a:avLst/>
@@ -11658,7 +11663,7 @@
         </p:nvCxnSpPr>
         <p:spPr>
           <a:xfrm flipV="1">
-            <a:off x="609600" y="12420596"/>
+            <a:off x="838200" y="12420596"/>
             <a:ext cx="152400" cy="152404"/>
           </a:xfrm>
           <a:prstGeom prst="line">
@@ -11695,7 +11700,7 @@
         </p:nvSpPr>
         <p:spPr>
           <a:xfrm>
-            <a:off x="914400" y="12344396"/>
+            <a:off x="1143000" y="12344396"/>
             <a:ext cx="457200" cy="152400"/>
           </a:xfrm>
           <a:prstGeom prst="rect">
@@ -11747,7 +11752,7 @@
         </p:nvSpPr>
         <p:spPr>
           <a:xfrm>
-            <a:off x="609601" y="12344396"/>
+            <a:off x="838201" y="12344396"/>
             <a:ext cx="152400" cy="76200"/>
           </a:xfrm>
           <a:prstGeom prst="rect">
@@ -11800,7 +11805,7 @@
         </p:nvSpPr>
         <p:spPr>
           <a:xfrm>
-            <a:off x="304800" y="12420596"/>
+            <a:off x="533400" y="12420596"/>
             <a:ext cx="228600" cy="152400"/>
           </a:xfrm>
           <a:prstGeom prst="homePlate">
@@ -11851,7 +11856,7 @@
         </p:nvCxnSpPr>
         <p:spPr>
           <a:xfrm flipV="1">
-            <a:off x="609600" y="12725396"/>
+            <a:off x="838200" y="12725396"/>
             <a:ext cx="152400" cy="152404"/>
           </a:xfrm>
           <a:prstGeom prst="line">
@@ -11888,7 +11893,7 @@
         </p:nvSpPr>
         <p:spPr>
           <a:xfrm>
-            <a:off x="914400" y="12649196"/>
+            <a:off x="1143000" y="12649196"/>
             <a:ext cx="457200" cy="152400"/>
           </a:xfrm>
           <a:prstGeom prst="rect">
@@ -11940,7 +11945,7 @@
         </p:nvSpPr>
         <p:spPr>
           <a:xfrm>
-            <a:off x="609600" y="12649196"/>
+            <a:off x="838200" y="12649196"/>
             <a:ext cx="152400" cy="76200"/>
           </a:xfrm>
           <a:prstGeom prst="rect">
@@ -11993,7 +11998,7 @@
         </p:nvSpPr>
         <p:spPr>
           <a:xfrm>
-            <a:off x="304800" y="12725396"/>
+            <a:off x="533400" y="12725396"/>
             <a:ext cx="228600" cy="152400"/>
           </a:xfrm>
           <a:prstGeom prst="homePlate">
@@ -12044,8 +12049,8 @@
         </p:nvCxnSpPr>
         <p:spPr>
           <a:xfrm>
-            <a:off x="17983200" y="9220200"/>
-            <a:ext cx="1524000" cy="0"/>
+            <a:off x="19431000" y="9220200"/>
+            <a:ext cx="1828800" cy="0"/>
           </a:xfrm>
           <a:prstGeom prst="line">
             <a:avLst/>
@@ -12076,13 +12081,15 @@
       <p:cxnSp>
         <p:nvCxnSpPr>
           <p:cNvPr id="387" name="Straight Connector 386"/>
-          <p:cNvCxnSpPr/>
+          <p:cNvCxnSpPr>
+            <a:endCxn id="223" idx="1"/>
+          </p:cNvCxnSpPr>
           <p:nvPr/>
         </p:nvCxnSpPr>
         <p:spPr>
           <a:xfrm>
-            <a:off x="17983200" y="9448800"/>
-            <a:ext cx="1524000" cy="0"/>
+            <a:off x="19431000" y="9448800"/>
+            <a:ext cx="1828800" cy="0"/>
           </a:xfrm>
           <a:prstGeom prst="line">
             <a:avLst/>
@@ -12118,7 +12125,7 @@
         </p:nvCxnSpPr>
         <p:spPr>
           <a:xfrm>
-            <a:off x="18592800" y="9220200"/>
+            <a:off x="20040600" y="9220200"/>
             <a:ext cx="0" cy="3276600"/>
           </a:xfrm>
           <a:prstGeom prst="line">
@@ -12155,7 +12162,7 @@
         </p:nvCxnSpPr>
         <p:spPr>
           <a:xfrm>
-            <a:off x="18897600" y="9448800"/>
+            <a:off x="20345400" y="9448800"/>
             <a:ext cx="0" cy="3352800"/>
           </a:xfrm>
           <a:prstGeom prst="line">
@@ -12192,7 +12199,7 @@
         </p:nvCxnSpPr>
         <p:spPr>
           <a:xfrm>
-            <a:off x="7010400" y="9448800"/>
+            <a:off x="8458200" y="9448800"/>
             <a:ext cx="304800" cy="0"/>
           </a:xfrm>
           <a:prstGeom prst="line">
@@ -12229,7 +12236,7 @@
         </p:nvCxnSpPr>
         <p:spPr>
           <a:xfrm flipV="1">
-            <a:off x="7010400" y="9448800"/>
+            <a:off x="8458200" y="9448800"/>
             <a:ext cx="0" cy="3352800"/>
           </a:xfrm>
           <a:prstGeom prst="line">
@@ -12266,7 +12273,7 @@
         </p:nvCxnSpPr>
         <p:spPr>
           <a:xfrm flipV="1">
-            <a:off x="6705600" y="9220200"/>
+            <a:off x="8153400" y="9220200"/>
             <a:ext cx="0" cy="3276600"/>
           </a:xfrm>
           <a:prstGeom prst="line">
@@ -12303,7 +12310,7 @@
         </p:nvCxnSpPr>
         <p:spPr>
           <a:xfrm>
-            <a:off x="6705600" y="9220200"/>
+            <a:off x="8153400" y="9220200"/>
             <a:ext cx="609600" cy="0"/>
           </a:xfrm>
           <a:prstGeom prst="line">
@@ -12340,7 +12347,7 @@
         </p:nvCxnSpPr>
         <p:spPr>
           <a:xfrm flipV="1">
-            <a:off x="3962400" y="8610600"/>
+            <a:off x="4191000" y="8610600"/>
             <a:ext cx="0" cy="3886200"/>
           </a:xfrm>
           <a:prstGeom prst="line">
@@ -12377,7 +12384,7 @@
         </p:nvCxnSpPr>
         <p:spPr>
           <a:xfrm>
-            <a:off x="3962400" y="8610600"/>
+            <a:off x="4191000" y="8610600"/>
             <a:ext cx="609600" cy="0"/>
           </a:xfrm>
           <a:prstGeom prst="line">
@@ -12414,7 +12421,7 @@
         </p:nvCxnSpPr>
         <p:spPr>
           <a:xfrm flipV="1">
-            <a:off x="4267200" y="8915400"/>
+            <a:off x="4495800" y="8915400"/>
             <a:ext cx="0" cy="3886200"/>
           </a:xfrm>
           <a:prstGeom prst="line">
@@ -12451,7 +12458,7 @@
         </p:nvCxnSpPr>
         <p:spPr>
           <a:xfrm>
-            <a:off x="4267200" y="8915400"/>
+            <a:off x="4495800" y="8915400"/>
             <a:ext cx="304800" cy="0"/>
           </a:xfrm>
           <a:prstGeom prst="line">
@@ -12488,7 +12495,7 @@
         </p:nvSpPr>
         <p:spPr>
           <a:xfrm>
-            <a:off x="24993600" y="8153400"/>
+            <a:off x="26746200" y="8153400"/>
             <a:ext cx="228600" cy="152400"/>
           </a:xfrm>
           <a:prstGeom prst="homePlate">
@@ -12541,7 +12548,7 @@
         </p:nvCxnSpPr>
         <p:spPr>
           <a:xfrm>
-            <a:off x="23469600" y="8229600"/>
+            <a:off x="25222200" y="8229600"/>
             <a:ext cx="1524000" cy="0"/>
           </a:xfrm>
           <a:prstGeom prst="line">
@@ -12578,7 +12585,7 @@
         </p:nvCxnSpPr>
         <p:spPr>
           <a:xfrm flipV="1">
-            <a:off x="24765000" y="8153400"/>
+            <a:off x="26517600" y="8153400"/>
             <a:ext cx="152400" cy="152404"/>
           </a:xfrm>
           <a:prstGeom prst="line">
@@ -12615,7 +12622,7 @@
         </p:nvSpPr>
         <p:spPr>
           <a:xfrm>
-            <a:off x="24765001" y="8077200"/>
+            <a:off x="26517601" y="8077200"/>
             <a:ext cx="152400" cy="76200"/>
           </a:xfrm>
           <a:prstGeom prst="rect">
@@ -12668,7 +12675,7 @@
         </p:nvSpPr>
         <p:spPr>
           <a:xfrm>
-            <a:off x="23774400" y="8077200"/>
+            <a:off x="25527000" y="8077200"/>
             <a:ext cx="457200" cy="152400"/>
           </a:xfrm>
           <a:prstGeom prst="rect">
@@ -12720,7 +12727,7 @@
         </p:nvSpPr>
         <p:spPr>
           <a:xfrm>
-            <a:off x="18135600" y="8686800"/>
+            <a:off x="19583400" y="8686800"/>
             <a:ext cx="457200" cy="152400"/>
           </a:xfrm>
           <a:prstGeom prst="rect">
@@ -12772,7 +12779,7 @@
         </p:nvCxnSpPr>
         <p:spPr>
           <a:xfrm>
-            <a:off x="21945600" y="7620000"/>
+            <a:off x="23698200" y="7620000"/>
             <a:ext cx="304800" cy="0"/>
           </a:xfrm>
           <a:prstGeom prst="line">
@@ -12809,8 +12816,8 @@
         </p:nvCxnSpPr>
         <p:spPr>
           <a:xfrm>
-            <a:off x="5791200" y="6934200"/>
-            <a:ext cx="15849600" cy="0"/>
+            <a:off x="6019800" y="6934200"/>
+            <a:ext cx="17373600" cy="0"/>
           </a:xfrm>
           <a:prstGeom prst="line">
             <a:avLst/>
@@ -12846,7 +12853,7 @@
         </p:nvCxnSpPr>
         <p:spPr>
           <a:xfrm>
-            <a:off x="13716000" y="7924800"/>
+            <a:off x="15163800" y="7924800"/>
             <a:ext cx="304800" cy="0"/>
           </a:xfrm>
           <a:prstGeom prst="line">
@@ -12883,7 +12890,7 @@
         </p:nvCxnSpPr>
         <p:spPr>
           <a:xfrm>
-            <a:off x="13716000" y="6934200"/>
+            <a:off x="15163800" y="6934200"/>
             <a:ext cx="0" cy="990600"/>
           </a:xfrm>
           <a:prstGeom prst="line">
@@ -12920,7 +12927,7 @@
         </p:nvCxnSpPr>
         <p:spPr>
           <a:xfrm>
-            <a:off x="19126200" y="7924800"/>
+            <a:off x="20878800" y="7772400"/>
             <a:ext cx="381000" cy="0"/>
           </a:xfrm>
           <a:prstGeom prst="line">
@@ -12957,7 +12964,7 @@
         </p:nvCxnSpPr>
         <p:spPr>
           <a:xfrm>
-            <a:off x="19050000" y="6934200"/>
+            <a:off x="20802600" y="6934200"/>
             <a:ext cx="0" cy="304800"/>
           </a:xfrm>
           <a:prstGeom prst="line">
@@ -12994,7 +13001,7 @@
         </p:nvCxnSpPr>
         <p:spPr>
           <a:xfrm>
-            <a:off x="21640800" y="7924800"/>
+            <a:off x="23393400" y="7924800"/>
             <a:ext cx="609600" cy="0"/>
           </a:xfrm>
           <a:prstGeom prst="line">
@@ -13031,7 +13038,7 @@
         </p:nvCxnSpPr>
         <p:spPr>
           <a:xfrm>
-            <a:off x="21640800" y="6934200"/>
+            <a:off x="23393400" y="6934200"/>
             <a:ext cx="0" cy="990600"/>
           </a:xfrm>
           <a:prstGeom prst="line">
@@ -13068,7 +13075,7 @@
         </p:nvSpPr>
         <p:spPr>
           <a:xfrm>
-            <a:off x="14782800" y="9144000"/>
+            <a:off x="16230600" y="9144000"/>
             <a:ext cx="457200" cy="152400"/>
           </a:xfrm>
           <a:prstGeom prst="rect">
@@ -13121,7 +13128,7 @@
         </p:nvCxnSpPr>
         <p:spPr>
           <a:xfrm>
-            <a:off x="15849600" y="9220200"/>
+            <a:off x="17297400" y="9220200"/>
             <a:ext cx="0" cy="2667000"/>
           </a:xfrm>
           <a:prstGeom prst="line">
@@ -13158,7 +13165,7 @@
         </p:nvSpPr>
         <p:spPr>
           <a:xfrm>
-            <a:off x="6248400" y="8077200"/>
+            <a:off x="6400800" y="8077200"/>
             <a:ext cx="457200" cy="152400"/>
           </a:xfrm>
           <a:prstGeom prst="rect">
@@ -13217,7 +13224,7 @@
         </p:nvSpPr>
         <p:spPr>
           <a:xfrm>
-            <a:off x="8991600" y="8077200"/>
+            <a:off x="10439400" y="8077200"/>
             <a:ext cx="457200" cy="152400"/>
           </a:xfrm>
           <a:prstGeom prst="rect">
@@ -13276,7 +13283,7 @@
         </p:nvSpPr>
         <p:spPr>
           <a:xfrm>
-            <a:off x="15697200" y="8077200"/>
+            <a:off x="17145000" y="8077200"/>
             <a:ext cx="457200" cy="152400"/>
           </a:xfrm>
           <a:prstGeom prst="rect">
@@ -13335,7 +13342,7 @@
         </p:nvSpPr>
         <p:spPr>
           <a:xfrm>
-            <a:off x="18440400" y="8077200"/>
+            <a:off x="19888200" y="8077200"/>
             <a:ext cx="457200" cy="152400"/>
           </a:xfrm>
           <a:prstGeom prst="rect">
@@ -13394,7 +13401,7 @@
         </p:nvSpPr>
         <p:spPr>
           <a:xfrm>
-            <a:off x="21183600" y="8077200"/>
+            <a:off x="22936200" y="8077200"/>
             <a:ext cx="457200" cy="152400"/>
           </a:xfrm>
           <a:prstGeom prst="rect">
@@ -13453,7 +13460,7 @@
         </p:nvSpPr>
         <p:spPr>
           <a:xfrm>
-            <a:off x="6248400" y="8382000"/>
+            <a:off x="6400800" y="8382000"/>
             <a:ext cx="457200" cy="152400"/>
           </a:xfrm>
           <a:prstGeom prst="rect">
@@ -13512,7 +13519,7 @@
         </p:nvSpPr>
         <p:spPr>
           <a:xfrm>
-            <a:off x="6248400" y="8686800"/>
+            <a:off x="6400800" y="8686800"/>
             <a:ext cx="457200" cy="152400"/>
           </a:xfrm>
           <a:prstGeom prst="rect">
@@ -13571,7 +13578,7 @@
         </p:nvSpPr>
         <p:spPr>
           <a:xfrm>
-            <a:off x="18440400" y="8382000"/>
+            <a:off x="19888200" y="8382000"/>
             <a:ext cx="457200" cy="152400"/>
           </a:xfrm>
           <a:prstGeom prst="rect">
@@ -13630,7 +13637,7 @@
         </p:nvSpPr>
         <p:spPr>
           <a:xfrm>
-            <a:off x="21183600" y="8382000"/>
+            <a:off x="22936200" y="8382000"/>
             <a:ext cx="457200" cy="152400"/>
           </a:xfrm>
           <a:prstGeom prst="rect">
@@ -13689,7 +13696,7 @@
         </p:nvSpPr>
         <p:spPr>
           <a:xfrm>
-            <a:off x="21183600" y="8686800"/>
+            <a:off x="22936200" y="8686800"/>
             <a:ext cx="457200" cy="152400"/>
           </a:xfrm>
           <a:prstGeom prst="rect">
@@ -13741,7 +13748,7 @@
         </p:nvCxnSpPr>
         <p:spPr>
           <a:xfrm flipV="1">
-            <a:off x="5943600" y="6858000"/>
+            <a:off x="6172200" y="6858000"/>
             <a:ext cx="152400" cy="152404"/>
           </a:xfrm>
           <a:prstGeom prst="line">
@@ -13778,7 +13785,7 @@
         </p:nvSpPr>
         <p:spPr>
           <a:xfrm>
-            <a:off x="5943601" y="6781800"/>
+            <a:off x="6172201" y="6781800"/>
             <a:ext cx="152400" cy="76200"/>
           </a:xfrm>
           <a:prstGeom prst="rect">
@@ -13831,7 +13838,7 @@
         </p:nvSpPr>
         <p:spPr>
           <a:xfrm>
-            <a:off x="6248400" y="6781800"/>
+            <a:off x="6400800" y="6781800"/>
             <a:ext cx="457200" cy="152400"/>
           </a:xfrm>
           <a:prstGeom prst="rect">
@@ -13890,7 +13897,7 @@
         </p:nvCxnSpPr>
         <p:spPr>
           <a:xfrm flipV="1">
-            <a:off x="609600" y="6096000"/>
+            <a:off x="838200" y="6096000"/>
             <a:ext cx="152400" cy="152404"/>
           </a:xfrm>
           <a:prstGeom prst="line">
@@ -13927,7 +13934,7 @@
         </p:nvSpPr>
         <p:spPr>
           <a:xfrm>
-            <a:off x="914400" y="6019800"/>
+            <a:off x="1143000" y="6019800"/>
             <a:ext cx="457200" cy="152400"/>
           </a:xfrm>
           <a:prstGeom prst="rect">
@@ -13979,7 +13986,7 @@
         </p:nvSpPr>
         <p:spPr>
           <a:xfrm>
-            <a:off x="609601" y="6019800"/>
+            <a:off x="838201" y="6019800"/>
             <a:ext cx="152400" cy="76200"/>
           </a:xfrm>
           <a:prstGeom prst="rect">
@@ -14032,7 +14039,7 @@
         </p:nvSpPr>
         <p:spPr>
           <a:xfrm>
-            <a:off x="304800" y="6096000"/>
+            <a:off x="533400" y="6096000"/>
             <a:ext cx="228600" cy="152400"/>
           </a:xfrm>
           <a:prstGeom prst="homePlate">
@@ -14085,8 +14092,8 @@
         </p:nvCxnSpPr>
         <p:spPr>
           <a:xfrm>
-            <a:off x="3657600" y="6248400"/>
-            <a:ext cx="18288000" cy="0"/>
+            <a:off x="3886200" y="6248400"/>
+            <a:ext cx="19812000" cy="0"/>
           </a:xfrm>
           <a:prstGeom prst="line">
             <a:avLst/>
@@ -14122,7 +14129,7 @@
         </p:nvCxnSpPr>
         <p:spPr>
           <a:xfrm>
-            <a:off x="4267200" y="6248400"/>
+            <a:off x="4495800" y="6248400"/>
             <a:ext cx="0" cy="685800"/>
           </a:xfrm>
           <a:prstGeom prst="line">
@@ -14159,7 +14166,7 @@
         </p:nvSpPr>
         <p:spPr>
           <a:xfrm rot="16200000">
-            <a:off x="18973800" y="7162800"/>
+            <a:off x="20726400" y="7162800"/>
             <a:ext cx="304800" cy="304800"/>
           </a:xfrm>
           <a:prstGeom prst="moon">
@@ -14207,7 +14214,7 @@
         </p:nvCxnSpPr>
         <p:spPr>
           <a:xfrm>
-            <a:off x="21945600" y="6248400"/>
+            <a:off x="23698200" y="6248400"/>
             <a:ext cx="0" cy="1371600"/>
           </a:xfrm>
           <a:prstGeom prst="line">
@@ -14246,8 +14253,8 @@
         </p:nvCxnSpPr>
         <p:spPr>
           <a:xfrm>
-            <a:off x="19126200" y="7467600"/>
-            <a:ext cx="0" cy="457200"/>
+            <a:off x="20878800" y="7467600"/>
+            <a:ext cx="0" cy="304800"/>
           </a:xfrm>
           <a:prstGeom prst="line">
             <a:avLst/>
@@ -14283,7 +14290,7 @@
         </p:nvCxnSpPr>
         <p:spPr>
           <a:xfrm>
-            <a:off x="19202400" y="6248400"/>
+            <a:off x="20955000" y="6248400"/>
             <a:ext cx="0" cy="990600"/>
           </a:xfrm>
           <a:prstGeom prst="line">
@@ -14320,7 +14327,7 @@
         </p:nvSpPr>
         <p:spPr>
           <a:xfrm>
-            <a:off x="23012400" y="8458200"/>
+            <a:off x="24765000" y="8458200"/>
             <a:ext cx="457200" cy="152400"/>
           </a:xfrm>
           <a:prstGeom prst="rect">
@@ -14373,7 +14380,7 @@
         </p:nvSpPr>
         <p:spPr>
           <a:xfrm>
-            <a:off x="24993600" y="8458200"/>
+            <a:off x="26746200" y="8458200"/>
             <a:ext cx="228600" cy="152400"/>
           </a:xfrm>
           <a:prstGeom prst="homePlate">
@@ -14426,7 +14433,7 @@
         </p:nvCxnSpPr>
         <p:spPr>
           <a:xfrm>
-            <a:off x="23469600" y="8534400"/>
+            <a:off x="25222200" y="8534400"/>
             <a:ext cx="1524000" cy="0"/>
           </a:xfrm>
           <a:prstGeom prst="line">
@@ -14463,7 +14470,7 @@
         </p:nvCxnSpPr>
         <p:spPr>
           <a:xfrm flipV="1">
-            <a:off x="24765000" y="8458200"/>
+            <a:off x="26517600" y="8458200"/>
             <a:ext cx="152400" cy="152404"/>
           </a:xfrm>
           <a:prstGeom prst="line">
@@ -14500,7 +14507,7 @@
         </p:nvSpPr>
         <p:spPr>
           <a:xfrm>
-            <a:off x="24765001" y="8382000"/>
+            <a:off x="26517601" y="8382000"/>
             <a:ext cx="152400" cy="76200"/>
           </a:xfrm>
           <a:prstGeom prst="rect">
@@ -14553,7 +14560,7 @@
         </p:nvSpPr>
         <p:spPr>
           <a:xfrm>
-            <a:off x="23774400" y="8382000"/>
+            <a:off x="25527000" y="8382000"/>
             <a:ext cx="457200" cy="152400"/>
           </a:xfrm>
           <a:prstGeom prst="rect">
@@ -14605,7 +14612,7 @@
         </p:nvSpPr>
         <p:spPr>
           <a:xfrm>
-            <a:off x="2362200" y="6705600"/>
+            <a:off x="2590800" y="6705602"/>
             <a:ext cx="304800" cy="304793"/>
           </a:xfrm>
           <a:prstGeom prst="rect">
@@ -14651,7 +14658,7 @@
         </p:nvCxnSpPr>
         <p:spPr>
           <a:xfrm flipV="1">
-            <a:off x="2438401" y="6934161"/>
+            <a:off x="2667001" y="6934161"/>
             <a:ext cx="76200" cy="76200"/>
           </a:xfrm>
           <a:prstGeom prst="line">
@@ -14686,7 +14693,7 @@
         </p:nvCxnSpPr>
         <p:spPr>
           <a:xfrm flipH="1" flipV="1">
-            <a:off x="2514601" y="6934161"/>
+            <a:off x="2743201" y="6934161"/>
             <a:ext cx="76200" cy="76200"/>
           </a:xfrm>
           <a:prstGeom prst="line">
@@ -14721,7 +14728,7 @@
         </p:nvSpPr>
         <p:spPr>
           <a:xfrm>
-            <a:off x="2438400" y="6705568"/>
+            <a:off x="2667000" y="6705568"/>
             <a:ext cx="152400" cy="152400"/>
           </a:xfrm>
           <a:prstGeom prst="rect">
@@ -14776,7 +14783,7 @@
         </p:nvCxnSpPr>
         <p:spPr>
           <a:xfrm>
-            <a:off x="533400" y="6172200"/>
+            <a:off x="762000" y="6172200"/>
             <a:ext cx="2895600" cy="0"/>
           </a:xfrm>
           <a:prstGeom prst="line">
@@ -14813,7 +14820,7 @@
         </p:nvSpPr>
         <p:spPr>
           <a:xfrm>
-            <a:off x="3276600" y="6248400"/>
+            <a:off x="3505200" y="6248400"/>
             <a:ext cx="152400" cy="152400"/>
           </a:xfrm>
           <a:prstGeom prst="ellipse">
@@ -14859,7 +14866,7 @@
         </p:nvSpPr>
         <p:spPr>
           <a:xfrm rot="10800000">
-            <a:off x="3352800" y="6096000"/>
+            <a:off x="3581400" y="6096000"/>
             <a:ext cx="304800" cy="304800"/>
           </a:xfrm>
           <a:prstGeom prst="moon">
@@ -14909,7 +14916,7 @@
         </p:nvCxnSpPr>
         <p:spPr>
           <a:xfrm>
-            <a:off x="2971800" y="6324600"/>
+            <a:off x="3200400" y="6324600"/>
             <a:ext cx="304800" cy="0"/>
           </a:xfrm>
           <a:prstGeom prst="line">
@@ -14946,7 +14953,7 @@
         </p:nvCxnSpPr>
         <p:spPr>
           <a:xfrm flipV="1">
-            <a:off x="2971800" y="6324600"/>
+            <a:off x="3200400" y="6324600"/>
             <a:ext cx="0" cy="457200"/>
           </a:xfrm>
           <a:prstGeom prst="line">
@@ -14983,7 +14990,7 @@
         </p:nvCxnSpPr>
         <p:spPr>
           <a:xfrm>
-            <a:off x="2667000" y="6781800"/>
+            <a:off x="2895600" y="6781800"/>
             <a:ext cx="304800" cy="0"/>
           </a:xfrm>
           <a:prstGeom prst="line">
@@ -15020,7 +15027,7 @@
         </p:nvSpPr>
         <p:spPr>
           <a:xfrm>
-            <a:off x="2057400" y="6705600"/>
+            <a:off x="2286000" y="6705602"/>
             <a:ext cx="304800" cy="304793"/>
           </a:xfrm>
           <a:prstGeom prst="rect">
@@ -15066,7 +15073,7 @@
         </p:nvCxnSpPr>
         <p:spPr>
           <a:xfrm flipV="1">
-            <a:off x="2133601" y="6934161"/>
+            <a:off x="2362201" y="6934161"/>
             <a:ext cx="76200" cy="76200"/>
           </a:xfrm>
           <a:prstGeom prst="line">
@@ -15101,7 +15108,7 @@
         </p:nvCxnSpPr>
         <p:spPr>
           <a:xfrm flipH="1" flipV="1">
-            <a:off x="2209801" y="6934161"/>
+            <a:off x="2438401" y="6934161"/>
             <a:ext cx="76200" cy="76200"/>
           </a:xfrm>
           <a:prstGeom prst="line">
@@ -15136,7 +15143,7 @@
         </p:nvSpPr>
         <p:spPr>
           <a:xfrm>
-            <a:off x="2133600" y="6705568"/>
+            <a:off x="2362200" y="6705568"/>
             <a:ext cx="152400" cy="152400"/>
           </a:xfrm>
           <a:prstGeom prst="rect">
@@ -15189,7 +15196,7 @@
         </p:nvCxnSpPr>
         <p:spPr>
           <a:xfrm>
-            <a:off x="1752600" y="6781800"/>
+            <a:off x="1981200" y="6781800"/>
             <a:ext cx="304800" cy="0"/>
           </a:xfrm>
           <a:prstGeom prst="line">
@@ -15226,7 +15233,7 @@
         </p:nvCxnSpPr>
         <p:spPr>
           <a:xfrm flipV="1">
-            <a:off x="1752600" y="6781800"/>
+            <a:off x="1981200" y="6781800"/>
             <a:ext cx="0" cy="5410200"/>
           </a:xfrm>
           <a:prstGeom prst="line">
@@ -15263,7 +15270,7 @@
         </p:nvCxnSpPr>
         <p:spPr>
           <a:xfrm flipV="1">
-            <a:off x="2743200" y="6705600"/>
+            <a:off x="2971800" y="6705600"/>
             <a:ext cx="152400" cy="152404"/>
           </a:xfrm>
           <a:prstGeom prst="line">
@@ -15300,7 +15307,7 @@
         </p:nvSpPr>
         <p:spPr>
           <a:xfrm>
-            <a:off x="2743201" y="6629400"/>
+            <a:off x="2971801" y="6629400"/>
             <a:ext cx="152400" cy="76200"/>
           </a:xfrm>
           <a:prstGeom prst="rect">
@@ -15353,7 +15360,7 @@
         </p:nvSpPr>
         <p:spPr>
           <a:xfrm>
-            <a:off x="2819400" y="6781800"/>
+            <a:off x="3048000" y="6781800"/>
             <a:ext cx="457200" cy="152400"/>
           </a:xfrm>
           <a:prstGeom prst="rect">
@@ -15385,7 +15392,7 @@
           <a:lstStyle/>
           <a:p>
             <a:r>
-              <a:rPr lang="en-US" sz="900" dirty="0" smtClean="0">
+              <a:rPr lang="en-US" sz="900" dirty="0">
                 <a:solidFill>
                   <a:srgbClr val="000000"/>
                 </a:solidFill>
@@ -15412,7 +15419,7 @@
         </p:nvCxnSpPr>
         <p:spPr>
           <a:xfrm flipV="1">
-            <a:off x="3733800" y="6172200"/>
+            <a:off x="3962400" y="6172200"/>
             <a:ext cx="152400" cy="152404"/>
           </a:xfrm>
           <a:prstGeom prst="line">
@@ -15449,7 +15456,7 @@
         </p:nvSpPr>
         <p:spPr>
           <a:xfrm>
-            <a:off x="3733801" y="6096000"/>
+            <a:off x="3962401" y="6096000"/>
             <a:ext cx="152400" cy="76200"/>
           </a:xfrm>
           <a:prstGeom prst="rect">
@@ -15502,7 +15509,7 @@
         </p:nvSpPr>
         <p:spPr>
           <a:xfrm>
-            <a:off x="4038600" y="6096000"/>
+            <a:off x="4267200" y="6096000"/>
             <a:ext cx="457200" cy="152400"/>
           </a:xfrm>
           <a:prstGeom prst="rect">
@@ -15534,7 +15541,7 @@
           <a:lstStyle/>
           <a:p>
             <a:r>
-              <a:rPr lang="en-US" sz="900" dirty="0" err="1" smtClean="0">
+              <a:rPr lang="en-US" sz="900" dirty="0" err="1">
                 <a:solidFill>
                   <a:srgbClr val="000000"/>
                 </a:solidFill>
@@ -15561,7 +15568,7 @@
         </p:nvCxnSpPr>
         <p:spPr>
           <a:xfrm flipV="1">
-            <a:off x="2209800" y="7010400"/>
+            <a:off x="2438400" y="7010400"/>
             <a:ext cx="0" cy="5486400"/>
           </a:xfrm>
           <a:prstGeom prst="line">
@@ -15598,7 +15605,7 @@
         </p:nvCxnSpPr>
         <p:spPr>
           <a:xfrm>
-            <a:off x="2209800" y="7162800"/>
+            <a:off x="2438400" y="7162800"/>
             <a:ext cx="304800" cy="0"/>
           </a:xfrm>
           <a:prstGeom prst="line">
@@ -15635,7 +15642,7 @@
         </p:nvCxnSpPr>
         <p:spPr>
           <a:xfrm flipV="1">
-            <a:off x="2514600" y="7010400"/>
+            <a:off x="2743200" y="7010400"/>
             <a:ext cx="0" cy="152400"/>
           </a:xfrm>
           <a:prstGeom prst="line">
@@ -15672,7 +15679,7 @@
         </p:nvSpPr>
         <p:spPr>
           <a:xfrm>
-            <a:off x="2133600" y="6553200"/>
+            <a:off x="2362200" y="6553200"/>
             <a:ext cx="152400" cy="152400"/>
           </a:xfrm>
           <a:prstGeom prst="ellipse">
@@ -15718,7 +15725,7 @@
         </p:nvSpPr>
         <p:spPr>
           <a:xfrm>
-            <a:off x="2438400" y="6553200"/>
+            <a:off x="2667000" y="6553200"/>
             <a:ext cx="152400" cy="152400"/>
           </a:xfrm>
           <a:prstGeom prst="ellipse">
@@ -15764,7 +15771,7 @@
         </p:nvCxnSpPr>
         <p:spPr>
           <a:xfrm>
-            <a:off x="2209800" y="6400800"/>
+            <a:off x="2438400" y="6400800"/>
             <a:ext cx="0" cy="152400"/>
           </a:xfrm>
           <a:prstGeom prst="line">
@@ -15801,7 +15808,7 @@
         </p:nvCxnSpPr>
         <p:spPr>
           <a:xfrm>
-            <a:off x="2514600" y="6400800"/>
+            <a:off x="2743200" y="6400800"/>
             <a:ext cx="0" cy="152400"/>
           </a:xfrm>
           <a:prstGeom prst="line">
@@ -15838,7 +15845,7 @@
         </p:nvCxnSpPr>
         <p:spPr>
           <a:xfrm>
-            <a:off x="1905000" y="6400800"/>
+            <a:off x="2133600" y="6400800"/>
             <a:ext cx="609600" cy="0"/>
           </a:xfrm>
           <a:prstGeom prst="line">
@@ -15875,7 +15882,7 @@
         </p:nvSpPr>
         <p:spPr>
           <a:xfrm>
-            <a:off x="1676400" y="6248400"/>
+            <a:off x="1905000" y="6248400"/>
             <a:ext cx="457200" cy="152400"/>
           </a:xfrm>
           <a:prstGeom prst="rect">
@@ -15907,7 +15914,7 @@
           <a:lstStyle/>
           <a:p>
             <a:r>
-              <a:rPr lang="en-US" sz="900" dirty="0" smtClean="0">
+              <a:rPr lang="en-US" sz="900" dirty="0">
                 <a:solidFill>
                   <a:srgbClr val="000000"/>
                 </a:solidFill>
@@ -15926,6 +15933,1510 @@
           </a:p>
         </p:txBody>
       </p:sp>
+      <p:sp>
+        <p:nvSpPr>
+          <p:cNvPr id="398" name="Trapezoid 397"/>
+          <p:cNvSpPr/>
+          <p:nvPr/>
+        </p:nvSpPr>
+        <p:spPr>
+          <a:xfrm rot="5400000">
+            <a:off x="7734300" y="7658100"/>
+            <a:ext cx="1143000" cy="457200"/>
+          </a:xfrm>
+          <a:prstGeom prst="trapezoid">
+            <a:avLst>
+              <a:gd name="adj" fmla="val 34594"/>
+            </a:avLst>
+          </a:prstGeom>
+          <a:noFill/>
+          <a:ln w="12700">
+            <a:solidFill>
+              <a:srgbClr val="000000"/>
+            </a:solidFill>
+          </a:ln>
+        </p:spPr>
+        <p:style>
+          <a:lnRef idx="2">
+            <a:schemeClr val="accent1">
+              <a:shade val="50000"/>
+            </a:schemeClr>
+          </a:lnRef>
+          <a:fillRef idx="1">
+            <a:schemeClr val="accent1"/>
+          </a:fillRef>
+          <a:effectRef idx="0">
+            <a:schemeClr val="accent1"/>
+          </a:effectRef>
+          <a:fontRef idx="minor">
+            <a:schemeClr val="lt1"/>
+          </a:fontRef>
+        </p:style>
+        <p:txBody>
+          <a:bodyPr rtlCol="0" anchor="ctr"/>
+          <a:lstStyle/>
+          <a:p>
+            <a:pPr algn="ctr"/>
+            <a:endParaRPr lang="en-US" sz="3730"/>
+          </a:p>
+        </p:txBody>
+      </p:sp>
+      <p:sp>
+        <p:nvSpPr>
+          <p:cNvPr id="433" name="Rectangle 432"/>
+          <p:cNvSpPr/>
+          <p:nvPr/>
+        </p:nvSpPr>
+        <p:spPr>
+          <a:xfrm>
+            <a:off x="8077200" y="7467600"/>
+            <a:ext cx="457200" cy="152400"/>
+          </a:xfrm>
+          <a:prstGeom prst="rect">
+            <a:avLst/>
+          </a:prstGeom>
+          <a:noFill/>
+          <a:ln>
+            <a:noFill/>
+          </a:ln>
+        </p:spPr>
+        <p:style>
+          <a:lnRef idx="2">
+            <a:schemeClr val="accent1">
+              <a:shade val="50000"/>
+            </a:schemeClr>
+          </a:lnRef>
+          <a:fillRef idx="1">
+            <a:schemeClr val="accent1"/>
+          </a:fillRef>
+          <a:effectRef idx="0">
+            <a:schemeClr val="accent1"/>
+          </a:effectRef>
+          <a:fontRef idx="minor">
+            <a:schemeClr val="lt1"/>
+          </a:fontRef>
+        </p:style>
+        <p:txBody>
+          <a:bodyPr wrap="none" lIns="45720" rIns="45720" rtlCol="0" anchor="ctr"/>
+          <a:lstStyle/>
+          <a:p>
+            <a:r>
+              <a:rPr lang="en-US" sz="900" dirty="0">
+                <a:solidFill>
+                  <a:srgbClr val="000000"/>
+                </a:solidFill>
+                <a:latin typeface="Courier New" panose="02070309020205020404" pitchFamily="49" charset="0"/>
+                <a:cs typeface="Courier New" panose="02070309020205020404" pitchFamily="49" charset="0"/>
+              </a:rPr>
+              <a:t>2’d3</a:t>
+            </a:r>
+            <a:endParaRPr lang="en-US" sz="900" dirty="0">
+              <a:solidFill>
+                <a:srgbClr val="000000"/>
+              </a:solidFill>
+              <a:latin typeface="Courier New" panose="02070309020205020404" pitchFamily="49" charset="0"/>
+              <a:cs typeface="Courier New" panose="02070309020205020404" pitchFamily="49" charset="0"/>
+            </a:endParaRPr>
+          </a:p>
+        </p:txBody>
+      </p:sp>
+      <p:sp>
+        <p:nvSpPr>
+          <p:cNvPr id="434" name="Rectangle 433"/>
+          <p:cNvSpPr/>
+          <p:nvPr/>
+        </p:nvSpPr>
+        <p:spPr>
+          <a:xfrm>
+            <a:off x="8077200" y="7696200"/>
+            <a:ext cx="457200" cy="152400"/>
+          </a:xfrm>
+          <a:prstGeom prst="rect">
+            <a:avLst/>
+          </a:prstGeom>
+          <a:noFill/>
+          <a:ln>
+            <a:noFill/>
+          </a:ln>
+        </p:spPr>
+        <p:style>
+          <a:lnRef idx="2">
+            <a:schemeClr val="accent1">
+              <a:shade val="50000"/>
+            </a:schemeClr>
+          </a:lnRef>
+          <a:fillRef idx="1">
+            <a:schemeClr val="accent1"/>
+          </a:fillRef>
+          <a:effectRef idx="0">
+            <a:schemeClr val="accent1"/>
+          </a:effectRef>
+          <a:fontRef idx="minor">
+            <a:schemeClr val="lt1"/>
+          </a:fontRef>
+        </p:style>
+        <p:txBody>
+          <a:bodyPr wrap="none" lIns="45720" rIns="45720" rtlCol="0" anchor="ctr"/>
+          <a:lstStyle/>
+          <a:p>
+            <a:r>
+              <a:rPr lang="en-US" sz="900" dirty="0">
+                <a:solidFill>
+                  <a:srgbClr val="000000"/>
+                </a:solidFill>
+                <a:latin typeface="Courier New" panose="02070309020205020404" pitchFamily="49" charset="0"/>
+                <a:cs typeface="Courier New" panose="02070309020205020404" pitchFamily="49" charset="0"/>
+              </a:rPr>
+              <a:t>2’d2</a:t>
+            </a:r>
+            <a:endParaRPr lang="en-US" sz="900" dirty="0">
+              <a:solidFill>
+                <a:srgbClr val="000000"/>
+              </a:solidFill>
+              <a:latin typeface="Courier New" panose="02070309020205020404" pitchFamily="49" charset="0"/>
+              <a:cs typeface="Courier New" panose="02070309020205020404" pitchFamily="49" charset="0"/>
+            </a:endParaRPr>
+          </a:p>
+        </p:txBody>
+      </p:sp>
+      <p:sp>
+        <p:nvSpPr>
+          <p:cNvPr id="435" name="Rectangle 434"/>
+          <p:cNvSpPr/>
+          <p:nvPr/>
+        </p:nvSpPr>
+        <p:spPr>
+          <a:xfrm>
+            <a:off x="8077200" y="7924800"/>
+            <a:ext cx="457200" cy="152400"/>
+          </a:xfrm>
+          <a:prstGeom prst="rect">
+            <a:avLst/>
+          </a:prstGeom>
+          <a:noFill/>
+          <a:ln>
+            <a:noFill/>
+          </a:ln>
+        </p:spPr>
+        <p:style>
+          <a:lnRef idx="2">
+            <a:schemeClr val="accent1">
+              <a:shade val="50000"/>
+            </a:schemeClr>
+          </a:lnRef>
+          <a:fillRef idx="1">
+            <a:schemeClr val="accent1"/>
+          </a:fillRef>
+          <a:effectRef idx="0">
+            <a:schemeClr val="accent1"/>
+          </a:effectRef>
+          <a:fontRef idx="minor">
+            <a:schemeClr val="lt1"/>
+          </a:fontRef>
+        </p:style>
+        <p:txBody>
+          <a:bodyPr wrap="none" lIns="45720" rIns="45720" rtlCol="0" anchor="ctr"/>
+          <a:lstStyle/>
+          <a:p>
+            <a:r>
+              <a:rPr lang="en-US" sz="900" dirty="0">
+                <a:solidFill>
+                  <a:srgbClr val="000000"/>
+                </a:solidFill>
+                <a:latin typeface="Courier New" panose="02070309020205020404" pitchFamily="49" charset="0"/>
+                <a:cs typeface="Courier New" panose="02070309020205020404" pitchFamily="49" charset="0"/>
+              </a:rPr>
+              <a:t>2’d1</a:t>
+            </a:r>
+            <a:endParaRPr lang="en-US" sz="900" dirty="0">
+              <a:solidFill>
+                <a:srgbClr val="000000"/>
+              </a:solidFill>
+              <a:latin typeface="Courier New" panose="02070309020205020404" pitchFamily="49" charset="0"/>
+              <a:cs typeface="Courier New" panose="02070309020205020404" pitchFamily="49" charset="0"/>
+            </a:endParaRPr>
+          </a:p>
+        </p:txBody>
+      </p:sp>
+      <p:sp>
+        <p:nvSpPr>
+          <p:cNvPr id="436" name="Rectangle 435"/>
+          <p:cNvSpPr/>
+          <p:nvPr/>
+        </p:nvSpPr>
+        <p:spPr>
+          <a:xfrm>
+            <a:off x="8077200" y="8153400"/>
+            <a:ext cx="457200" cy="152400"/>
+          </a:xfrm>
+          <a:prstGeom prst="rect">
+            <a:avLst/>
+          </a:prstGeom>
+          <a:noFill/>
+          <a:ln>
+            <a:noFill/>
+          </a:ln>
+        </p:spPr>
+        <p:style>
+          <a:lnRef idx="2">
+            <a:schemeClr val="accent1">
+              <a:shade val="50000"/>
+            </a:schemeClr>
+          </a:lnRef>
+          <a:fillRef idx="1">
+            <a:schemeClr val="accent1"/>
+          </a:fillRef>
+          <a:effectRef idx="0">
+            <a:schemeClr val="accent1"/>
+          </a:effectRef>
+          <a:fontRef idx="minor">
+            <a:schemeClr val="lt1"/>
+          </a:fontRef>
+        </p:style>
+        <p:txBody>
+          <a:bodyPr wrap="none" lIns="45720" rIns="45720" rtlCol="0" anchor="ctr"/>
+          <a:lstStyle/>
+          <a:p>
+            <a:r>
+              <a:rPr lang="en-US" sz="900" dirty="0">
+                <a:solidFill>
+                  <a:srgbClr val="000000"/>
+                </a:solidFill>
+                <a:latin typeface="Courier New" panose="02070309020205020404" pitchFamily="49" charset="0"/>
+                <a:cs typeface="Courier New" panose="02070309020205020404" pitchFamily="49" charset="0"/>
+              </a:rPr>
+              <a:t>2’d0</a:t>
+            </a:r>
+            <a:endParaRPr lang="en-US" sz="900" dirty="0">
+              <a:solidFill>
+                <a:srgbClr val="000000"/>
+              </a:solidFill>
+              <a:latin typeface="Courier New" panose="02070309020205020404" pitchFamily="49" charset="0"/>
+              <a:cs typeface="Courier New" panose="02070309020205020404" pitchFamily="49" charset="0"/>
+            </a:endParaRPr>
+          </a:p>
+        </p:txBody>
+      </p:sp>
+      <p:sp>
+        <p:nvSpPr>
+          <p:cNvPr id="437" name="Rectangle 436"/>
+          <p:cNvSpPr/>
+          <p:nvPr/>
+        </p:nvSpPr>
+        <p:spPr>
+          <a:xfrm>
+            <a:off x="7543800" y="7391400"/>
+            <a:ext cx="457200" cy="152400"/>
+          </a:xfrm>
+          <a:prstGeom prst="rect">
+            <a:avLst/>
+          </a:prstGeom>
+          <a:noFill/>
+          <a:ln>
+            <a:noFill/>
+          </a:ln>
+        </p:spPr>
+        <p:style>
+          <a:lnRef idx="2">
+            <a:schemeClr val="accent1">
+              <a:shade val="50000"/>
+            </a:schemeClr>
+          </a:lnRef>
+          <a:fillRef idx="1">
+            <a:schemeClr val="accent1"/>
+          </a:fillRef>
+          <a:effectRef idx="0">
+            <a:schemeClr val="accent1"/>
+          </a:effectRef>
+          <a:fontRef idx="minor">
+            <a:schemeClr val="lt1"/>
+          </a:fontRef>
+        </p:style>
+        <p:txBody>
+          <a:bodyPr wrap="none" lIns="45720" rIns="45720" rtlCol="0" anchor="ctr"/>
+          <a:lstStyle/>
+          <a:p>
+            <a:r>
+              <a:rPr lang="en-US" sz="900" dirty="0">
+                <a:solidFill>
+                  <a:srgbClr val="000000"/>
+                </a:solidFill>
+                <a:latin typeface="Courier New" panose="02070309020205020404" pitchFamily="49" charset="0"/>
+                <a:cs typeface="Courier New" panose="02070309020205020404" pitchFamily="49" charset="0"/>
+              </a:rPr>
+              <a:t>64’d0</a:t>
+            </a:r>
+            <a:endParaRPr lang="en-US" sz="900" dirty="0">
+              <a:solidFill>
+                <a:srgbClr val="000000"/>
+              </a:solidFill>
+              <a:latin typeface="Courier New" panose="02070309020205020404" pitchFamily="49" charset="0"/>
+              <a:cs typeface="Courier New" panose="02070309020205020404" pitchFamily="49" charset="0"/>
+            </a:endParaRPr>
+          </a:p>
+        </p:txBody>
+      </p:sp>
+      <p:sp>
+        <p:nvSpPr>
+          <p:cNvPr id="438" name="Rectangle 437"/>
+          <p:cNvSpPr/>
+          <p:nvPr/>
+        </p:nvSpPr>
+        <p:spPr>
+          <a:xfrm>
+            <a:off x="6324600" y="7848600"/>
+            <a:ext cx="457200" cy="152400"/>
+          </a:xfrm>
+          <a:prstGeom prst="rect">
+            <a:avLst/>
+          </a:prstGeom>
+          <a:noFill/>
+          <a:ln>
+            <a:noFill/>
+          </a:ln>
+        </p:spPr>
+        <p:style>
+          <a:lnRef idx="2">
+            <a:schemeClr val="accent1">
+              <a:shade val="50000"/>
+            </a:schemeClr>
+          </a:lnRef>
+          <a:fillRef idx="1">
+            <a:schemeClr val="accent1"/>
+          </a:fillRef>
+          <a:effectRef idx="0">
+            <a:schemeClr val="accent1"/>
+          </a:effectRef>
+          <a:fontRef idx="minor">
+            <a:schemeClr val="lt1"/>
+          </a:fontRef>
+        </p:style>
+        <p:txBody>
+          <a:bodyPr wrap="none" lIns="45720" rIns="45720" rtlCol="0" anchor="ctr"/>
+          <a:lstStyle/>
+          <a:p>
+            <a:r>
+              <a:rPr lang="en-US" sz="900" dirty="0">
+                <a:solidFill>
+                  <a:srgbClr val="000000"/>
+                </a:solidFill>
+                <a:latin typeface="Courier New" panose="02070309020205020404" pitchFamily="49" charset="0"/>
+                <a:cs typeface="Courier New" panose="02070309020205020404" pitchFamily="49" charset="0"/>
+              </a:rPr>
+              <a:t>64’hAAAA_AAAA_AAAA_AAAA</a:t>
+            </a:r>
+            <a:endParaRPr lang="en-US" sz="900" dirty="0">
+              <a:solidFill>
+                <a:srgbClr val="000000"/>
+              </a:solidFill>
+              <a:latin typeface="Courier New" panose="02070309020205020404" pitchFamily="49" charset="0"/>
+              <a:cs typeface="Courier New" panose="02070309020205020404" pitchFamily="49" charset="0"/>
+            </a:endParaRPr>
+          </a:p>
+        </p:txBody>
+      </p:sp>
+      <p:cxnSp>
+        <p:nvCxnSpPr>
+          <p:cNvPr id="440" name="Straight Connector 439"/>
+          <p:cNvCxnSpPr>
+            <a:stCxn id="153" idx="3"/>
+          </p:cNvCxnSpPr>
+          <p:nvPr/>
+        </p:nvCxnSpPr>
+        <p:spPr>
+          <a:xfrm>
+            <a:off x="6019800" y="8229600"/>
+            <a:ext cx="2057400" cy="0"/>
+          </a:xfrm>
+          <a:prstGeom prst="line">
+            <a:avLst/>
+          </a:prstGeom>
+          <a:ln w="12700">
+            <a:solidFill>
+              <a:srgbClr val="000000"/>
+            </a:solidFill>
+            <a:headEnd type="none" w="med" len="med"/>
+            <a:tailEnd type="none" w="med" len="med"/>
+          </a:ln>
+        </p:spPr>
+        <p:style>
+          <a:lnRef idx="1">
+            <a:schemeClr val="accent1"/>
+          </a:lnRef>
+          <a:fillRef idx="0">
+            <a:schemeClr val="accent1"/>
+          </a:fillRef>
+          <a:effectRef idx="0">
+            <a:schemeClr val="accent1"/>
+          </a:effectRef>
+          <a:fontRef idx="minor">
+            <a:schemeClr val="tx1"/>
+          </a:fontRef>
+        </p:style>
+      </p:cxnSp>
+      <p:cxnSp>
+        <p:nvCxnSpPr>
+          <p:cNvPr id="441" name="Straight Connector 440"/>
+          <p:cNvCxnSpPr/>
+          <p:nvPr/>
+        </p:nvCxnSpPr>
+        <p:spPr>
+          <a:xfrm>
+            <a:off x="7772400" y="8001000"/>
+            <a:ext cx="304800" cy="0"/>
+          </a:xfrm>
+          <a:prstGeom prst="line">
+            <a:avLst/>
+          </a:prstGeom>
+          <a:ln w="12700">
+            <a:solidFill>
+              <a:srgbClr val="000000"/>
+            </a:solidFill>
+            <a:headEnd type="none" w="med" len="med"/>
+            <a:tailEnd type="none" w="med" len="med"/>
+          </a:ln>
+        </p:spPr>
+        <p:style>
+          <a:lnRef idx="1">
+            <a:schemeClr val="accent1"/>
+          </a:lnRef>
+          <a:fillRef idx="0">
+            <a:schemeClr val="accent1"/>
+          </a:fillRef>
+          <a:effectRef idx="0">
+            <a:schemeClr val="accent1"/>
+          </a:effectRef>
+          <a:fontRef idx="minor">
+            <a:schemeClr val="tx1"/>
+          </a:fontRef>
+        </p:style>
+      </p:cxnSp>
+      <p:cxnSp>
+        <p:nvCxnSpPr>
+          <p:cNvPr id="442" name="Straight Connector 441"/>
+          <p:cNvCxnSpPr/>
+          <p:nvPr/>
+        </p:nvCxnSpPr>
+        <p:spPr>
+          <a:xfrm>
+            <a:off x="7772400" y="7772400"/>
+            <a:ext cx="304800" cy="0"/>
+          </a:xfrm>
+          <a:prstGeom prst="line">
+            <a:avLst/>
+          </a:prstGeom>
+          <a:ln w="12700">
+            <a:solidFill>
+              <a:srgbClr val="000000"/>
+            </a:solidFill>
+            <a:headEnd type="none" w="med" len="med"/>
+            <a:tailEnd type="none" w="med" len="med"/>
+          </a:ln>
+        </p:spPr>
+        <p:style>
+          <a:lnRef idx="1">
+            <a:schemeClr val="accent1"/>
+          </a:lnRef>
+          <a:fillRef idx="0">
+            <a:schemeClr val="accent1"/>
+          </a:fillRef>
+          <a:effectRef idx="0">
+            <a:schemeClr val="accent1"/>
+          </a:effectRef>
+          <a:fontRef idx="minor">
+            <a:schemeClr val="tx1"/>
+          </a:fontRef>
+        </p:style>
+      </p:cxnSp>
+      <p:cxnSp>
+        <p:nvCxnSpPr>
+          <p:cNvPr id="443" name="Straight Connector 442"/>
+          <p:cNvCxnSpPr/>
+          <p:nvPr/>
+        </p:nvCxnSpPr>
+        <p:spPr>
+          <a:xfrm>
+            <a:off x="7772400" y="7543800"/>
+            <a:ext cx="304800" cy="0"/>
+          </a:xfrm>
+          <a:prstGeom prst="line">
+            <a:avLst/>
+          </a:prstGeom>
+          <a:ln w="12700">
+            <a:solidFill>
+              <a:srgbClr val="000000"/>
+            </a:solidFill>
+            <a:headEnd type="none" w="med" len="med"/>
+            <a:tailEnd type="none" w="med" len="med"/>
+          </a:ln>
+        </p:spPr>
+        <p:style>
+          <a:lnRef idx="1">
+            <a:schemeClr val="accent1"/>
+          </a:lnRef>
+          <a:fillRef idx="0">
+            <a:schemeClr val="accent1"/>
+          </a:fillRef>
+          <a:effectRef idx="0">
+            <a:schemeClr val="accent1"/>
+          </a:effectRef>
+          <a:fontRef idx="minor">
+            <a:schemeClr val="tx1"/>
+          </a:fontRef>
+        </p:style>
+      </p:cxnSp>
+      <p:sp>
+        <p:nvSpPr>
+          <p:cNvPr id="444" name="Rectangle 443"/>
+          <p:cNvSpPr/>
+          <p:nvPr/>
+        </p:nvSpPr>
+        <p:spPr>
+          <a:xfrm>
+            <a:off x="7543800" y="7620000"/>
+            <a:ext cx="457200" cy="152400"/>
+          </a:xfrm>
+          <a:prstGeom prst="rect">
+            <a:avLst/>
+          </a:prstGeom>
+          <a:noFill/>
+          <a:ln>
+            <a:noFill/>
+          </a:ln>
+        </p:spPr>
+        <p:style>
+          <a:lnRef idx="2">
+            <a:schemeClr val="accent1">
+              <a:shade val="50000"/>
+            </a:schemeClr>
+          </a:lnRef>
+          <a:fillRef idx="1">
+            <a:schemeClr val="accent1"/>
+          </a:fillRef>
+          <a:effectRef idx="0">
+            <a:schemeClr val="accent1"/>
+          </a:effectRef>
+          <a:fontRef idx="minor">
+            <a:schemeClr val="lt1"/>
+          </a:fontRef>
+        </p:style>
+        <p:txBody>
+          <a:bodyPr wrap="none" lIns="45720" rIns="45720" rtlCol="0" anchor="ctr"/>
+          <a:lstStyle/>
+          <a:p>
+            <a:r>
+              <a:rPr lang="en-US" sz="900" dirty="0">
+                <a:solidFill>
+                  <a:srgbClr val="000000"/>
+                </a:solidFill>
+                <a:latin typeface="Courier New" panose="02070309020205020404" pitchFamily="49" charset="0"/>
+                <a:cs typeface="Courier New" panose="02070309020205020404" pitchFamily="49" charset="0"/>
+              </a:rPr>
+              <a:t>64’d0</a:t>
+            </a:r>
+            <a:endParaRPr lang="en-US" sz="900" dirty="0">
+              <a:solidFill>
+                <a:srgbClr val="000000"/>
+              </a:solidFill>
+              <a:latin typeface="Courier New" panose="02070309020205020404" pitchFamily="49" charset="0"/>
+              <a:cs typeface="Courier New" panose="02070309020205020404" pitchFamily="49" charset="0"/>
+            </a:endParaRPr>
+          </a:p>
+        </p:txBody>
+      </p:sp>
+      <p:cxnSp>
+        <p:nvCxnSpPr>
+          <p:cNvPr id="445" name="Straight Connector 444"/>
+          <p:cNvCxnSpPr/>
+          <p:nvPr/>
+        </p:nvCxnSpPr>
+        <p:spPr>
+          <a:xfrm flipV="1">
+            <a:off x="838200" y="5791200"/>
+            <a:ext cx="152400" cy="152404"/>
+          </a:xfrm>
+          <a:prstGeom prst="line">
+            <a:avLst/>
+          </a:prstGeom>
+          <a:ln w="12700">
+            <a:solidFill>
+              <a:srgbClr val="000000"/>
+            </a:solidFill>
+            <a:headEnd type="none" w="med" len="med"/>
+            <a:tailEnd type="none" w="med" len="med"/>
+          </a:ln>
+        </p:spPr>
+        <p:style>
+          <a:lnRef idx="1">
+            <a:schemeClr val="accent1"/>
+          </a:lnRef>
+          <a:fillRef idx="0">
+            <a:schemeClr val="accent1"/>
+          </a:fillRef>
+          <a:effectRef idx="0">
+            <a:schemeClr val="accent1"/>
+          </a:effectRef>
+          <a:fontRef idx="minor">
+            <a:schemeClr val="tx1"/>
+          </a:fontRef>
+        </p:style>
+      </p:cxnSp>
+      <p:sp>
+        <p:nvSpPr>
+          <p:cNvPr id="446" name="Rectangle 445"/>
+          <p:cNvSpPr/>
+          <p:nvPr/>
+        </p:nvSpPr>
+        <p:spPr>
+          <a:xfrm>
+            <a:off x="1143000" y="5715000"/>
+            <a:ext cx="457200" cy="152400"/>
+          </a:xfrm>
+          <a:prstGeom prst="rect">
+            <a:avLst/>
+          </a:prstGeom>
+          <a:noFill/>
+          <a:ln>
+            <a:noFill/>
+          </a:ln>
+        </p:spPr>
+        <p:style>
+          <a:lnRef idx="2">
+            <a:schemeClr val="accent1">
+              <a:shade val="50000"/>
+            </a:schemeClr>
+          </a:lnRef>
+          <a:fillRef idx="1">
+            <a:schemeClr val="accent1"/>
+          </a:fillRef>
+          <a:effectRef idx="0">
+            <a:schemeClr val="accent1"/>
+          </a:effectRef>
+          <a:fontRef idx="minor">
+            <a:schemeClr val="lt1"/>
+          </a:fontRef>
+        </p:style>
+        <p:txBody>
+          <a:bodyPr wrap="none" lIns="45720" rIns="45720" rtlCol="0" anchor="ctr"/>
+          <a:lstStyle/>
+          <a:p>
+            <a:r>
+              <a:rPr lang="en-US" sz="900" dirty="0">
+                <a:solidFill>
+                  <a:srgbClr val="000000"/>
+                </a:solidFill>
+                <a:latin typeface="Courier New" panose="02070309020205020404" pitchFamily="49" charset="0"/>
+                <a:cs typeface="Courier New" panose="02070309020205020404" pitchFamily="49" charset="0"/>
+              </a:rPr>
+              <a:t>PATTERN</a:t>
+            </a:r>
+            <a:endParaRPr lang="en-US" sz="900" dirty="0">
+              <a:solidFill>
+                <a:srgbClr val="000000"/>
+              </a:solidFill>
+              <a:latin typeface="Courier New" panose="02070309020205020404" pitchFamily="49" charset="0"/>
+              <a:cs typeface="Courier New" panose="02070309020205020404" pitchFamily="49" charset="0"/>
+            </a:endParaRPr>
+          </a:p>
+        </p:txBody>
+      </p:sp>
+      <p:sp>
+        <p:nvSpPr>
+          <p:cNvPr id="447" name="Rectangle 446"/>
+          <p:cNvSpPr/>
+          <p:nvPr/>
+        </p:nvSpPr>
+        <p:spPr>
+          <a:xfrm>
+            <a:off x="838201" y="5715000"/>
+            <a:ext cx="152400" cy="76200"/>
+          </a:xfrm>
+          <a:prstGeom prst="rect">
+            <a:avLst/>
+          </a:prstGeom>
+          <a:noFill/>
+          <a:ln>
+            <a:noFill/>
+          </a:ln>
+        </p:spPr>
+        <p:style>
+          <a:lnRef idx="2">
+            <a:schemeClr val="accent1">
+              <a:shade val="50000"/>
+            </a:schemeClr>
+          </a:lnRef>
+          <a:fillRef idx="1">
+            <a:schemeClr val="accent1"/>
+          </a:fillRef>
+          <a:effectRef idx="0">
+            <a:schemeClr val="accent1"/>
+          </a:effectRef>
+          <a:fontRef idx="minor">
+            <a:schemeClr val="lt1"/>
+          </a:fontRef>
+        </p:style>
+        <p:txBody>
+          <a:bodyPr wrap="none" lIns="45720" rIns="45720" rtlCol="0" anchor="ctr"/>
+          <a:lstStyle/>
+          <a:p>
+            <a:pPr algn="ctr"/>
+            <a:r>
+              <a:rPr lang="en-US" sz="900" dirty="0">
+                <a:solidFill>
+                  <a:srgbClr val="000000"/>
+                </a:solidFill>
+                <a:latin typeface="Courier New" panose="02070309020205020404" pitchFamily="49" charset="0"/>
+                <a:cs typeface="Courier New" panose="02070309020205020404" pitchFamily="49" charset="0"/>
+              </a:rPr>
+              <a:t>2</a:t>
+            </a:r>
+            <a:endParaRPr lang="en-US" sz="900" dirty="0">
+              <a:solidFill>
+                <a:srgbClr val="000000"/>
+              </a:solidFill>
+              <a:latin typeface="Courier New" panose="02070309020205020404" pitchFamily="49" charset="0"/>
+              <a:cs typeface="Courier New" panose="02070309020205020404" pitchFamily="49" charset="0"/>
+            </a:endParaRPr>
+          </a:p>
+        </p:txBody>
+      </p:sp>
+      <p:sp>
+        <p:nvSpPr>
+          <p:cNvPr id="448" name="Pentagon 447"/>
+          <p:cNvSpPr/>
+          <p:nvPr/>
+        </p:nvSpPr>
+        <p:spPr>
+          <a:xfrm>
+            <a:off x="533400" y="5791200"/>
+            <a:ext cx="228600" cy="152400"/>
+          </a:xfrm>
+          <a:prstGeom prst="homePlate">
+            <a:avLst/>
+          </a:prstGeom>
+          <a:noFill/>
+          <a:ln w="12700">
+            <a:solidFill>
+              <a:schemeClr val="tx1"/>
+            </a:solidFill>
+          </a:ln>
+        </p:spPr>
+        <p:style>
+          <a:lnRef idx="2">
+            <a:schemeClr val="accent1">
+              <a:shade val="50000"/>
+            </a:schemeClr>
+          </a:lnRef>
+          <a:fillRef idx="1">
+            <a:schemeClr val="accent1"/>
+          </a:fillRef>
+          <a:effectRef idx="0">
+            <a:schemeClr val="accent1"/>
+          </a:effectRef>
+          <a:fontRef idx="minor">
+            <a:schemeClr val="lt1"/>
+          </a:fontRef>
+        </p:style>
+        <p:txBody>
+          <a:bodyPr rot="0" spcFirstLastPara="0" vertOverflow="overflow" horzOverflow="overflow" vert="horz" wrap="square" lIns="91440" tIns="45720" rIns="91440" bIns="45720" numCol="1" spcCol="0" rtlCol="0" fromWordArt="0" anchor="ctr" anchorCtr="0" forceAA="0" compatLnSpc="1">
+            <a:prstTxWarp prst="textNoShape">
+              <a:avLst/>
+            </a:prstTxWarp>
+            <a:noAutofit/>
+          </a:bodyPr>
+          <a:lstStyle/>
+          <a:p>
+            <a:pPr algn="ctr"/>
+            <a:endParaRPr lang="en-US" sz="3730"/>
+          </a:p>
+        </p:txBody>
+      </p:sp>
+      <p:cxnSp>
+        <p:nvCxnSpPr>
+          <p:cNvPr id="449" name="Straight Connector 448"/>
+          <p:cNvCxnSpPr>
+            <a:stCxn id="448" idx="3"/>
+          </p:cNvCxnSpPr>
+          <p:nvPr/>
+        </p:nvCxnSpPr>
+        <p:spPr>
+          <a:xfrm>
+            <a:off x="762000" y="5867400"/>
+            <a:ext cx="7543800" cy="0"/>
+          </a:xfrm>
+          <a:prstGeom prst="line">
+            <a:avLst/>
+          </a:prstGeom>
+          <a:ln w="12700">
+            <a:solidFill>
+              <a:srgbClr val="000000"/>
+            </a:solidFill>
+            <a:headEnd type="none" w="med" len="med"/>
+            <a:tailEnd type="none" w="med" len="med"/>
+          </a:ln>
+        </p:spPr>
+        <p:style>
+          <a:lnRef idx="1">
+            <a:schemeClr val="accent1"/>
+          </a:lnRef>
+          <a:fillRef idx="0">
+            <a:schemeClr val="accent1"/>
+          </a:fillRef>
+          <a:effectRef idx="0">
+            <a:schemeClr val="accent1"/>
+          </a:effectRef>
+          <a:fontRef idx="minor">
+            <a:schemeClr val="tx1"/>
+          </a:fontRef>
+        </p:style>
+      </p:cxnSp>
+      <p:cxnSp>
+        <p:nvCxnSpPr>
+          <p:cNvPr id="450" name="Straight Connector 449"/>
+          <p:cNvCxnSpPr/>
+          <p:nvPr/>
+        </p:nvCxnSpPr>
+        <p:spPr>
+          <a:xfrm>
+            <a:off x="8305800" y="5867400"/>
+            <a:ext cx="0" cy="1524000"/>
+          </a:xfrm>
+          <a:prstGeom prst="line">
+            <a:avLst/>
+          </a:prstGeom>
+          <a:ln w="12700">
+            <a:solidFill>
+              <a:srgbClr val="000000"/>
+            </a:solidFill>
+            <a:headEnd type="none" w="med" len="med"/>
+            <a:tailEnd type="none" w="med" len="med"/>
+          </a:ln>
+        </p:spPr>
+        <p:style>
+          <a:lnRef idx="1">
+            <a:schemeClr val="accent1"/>
+          </a:lnRef>
+          <a:fillRef idx="0">
+            <a:schemeClr val="accent1"/>
+          </a:fillRef>
+          <a:effectRef idx="0">
+            <a:schemeClr val="accent1"/>
+          </a:effectRef>
+          <a:fontRef idx="minor">
+            <a:schemeClr val="tx1"/>
+          </a:fontRef>
+        </p:style>
+      </p:cxnSp>
+      <p:cxnSp>
+        <p:nvCxnSpPr>
+          <p:cNvPr id="451" name="Straight Connector 450"/>
+          <p:cNvCxnSpPr/>
+          <p:nvPr/>
+        </p:nvCxnSpPr>
+        <p:spPr>
+          <a:xfrm flipV="1">
+            <a:off x="838200" y="5486400"/>
+            <a:ext cx="152400" cy="152404"/>
+          </a:xfrm>
+          <a:prstGeom prst="line">
+            <a:avLst/>
+          </a:prstGeom>
+          <a:ln w="12700">
+            <a:solidFill>
+              <a:srgbClr val="000000"/>
+            </a:solidFill>
+            <a:headEnd type="none" w="med" len="med"/>
+            <a:tailEnd type="none" w="med" len="med"/>
+          </a:ln>
+        </p:spPr>
+        <p:style>
+          <a:lnRef idx="1">
+            <a:schemeClr val="accent1"/>
+          </a:lnRef>
+          <a:fillRef idx="0">
+            <a:schemeClr val="accent1"/>
+          </a:fillRef>
+          <a:effectRef idx="0">
+            <a:schemeClr val="accent1"/>
+          </a:effectRef>
+          <a:fontRef idx="minor">
+            <a:schemeClr val="tx1"/>
+          </a:fontRef>
+        </p:style>
+      </p:cxnSp>
+      <p:sp>
+        <p:nvSpPr>
+          <p:cNvPr id="452" name="Rectangle 451"/>
+          <p:cNvSpPr/>
+          <p:nvPr/>
+        </p:nvSpPr>
+        <p:spPr>
+          <a:xfrm>
+            <a:off x="1143000" y="5410200"/>
+            <a:ext cx="457200" cy="152400"/>
+          </a:xfrm>
+          <a:prstGeom prst="rect">
+            <a:avLst/>
+          </a:prstGeom>
+          <a:noFill/>
+          <a:ln>
+            <a:noFill/>
+          </a:ln>
+        </p:spPr>
+        <p:style>
+          <a:lnRef idx="2">
+            <a:schemeClr val="accent1">
+              <a:shade val="50000"/>
+            </a:schemeClr>
+          </a:lnRef>
+          <a:fillRef idx="1">
+            <a:schemeClr val="accent1"/>
+          </a:fillRef>
+          <a:effectRef idx="0">
+            <a:schemeClr val="accent1"/>
+          </a:effectRef>
+          <a:fontRef idx="minor">
+            <a:schemeClr val="lt1"/>
+          </a:fontRef>
+        </p:style>
+        <p:txBody>
+          <a:bodyPr wrap="none" lIns="45720" rIns="45720" rtlCol="0" anchor="ctr"/>
+          <a:lstStyle/>
+          <a:p>
+            <a:r>
+              <a:rPr lang="en-US" sz="900" dirty="0">
+                <a:solidFill>
+                  <a:srgbClr val="000000"/>
+                </a:solidFill>
+                <a:latin typeface="Courier New" panose="02070309020205020404" pitchFamily="49" charset="0"/>
+                <a:cs typeface="Courier New" panose="02070309020205020404" pitchFamily="49" charset="0"/>
+              </a:rPr>
+              <a:t>INV</a:t>
+            </a:r>
+            <a:endParaRPr lang="en-US" sz="900" dirty="0">
+              <a:solidFill>
+                <a:srgbClr val="000000"/>
+              </a:solidFill>
+              <a:latin typeface="Courier New" panose="02070309020205020404" pitchFamily="49" charset="0"/>
+              <a:cs typeface="Courier New" panose="02070309020205020404" pitchFamily="49" charset="0"/>
+            </a:endParaRPr>
+          </a:p>
+        </p:txBody>
+      </p:sp>
+      <p:sp>
+        <p:nvSpPr>
+          <p:cNvPr id="453" name="Rectangle 452"/>
+          <p:cNvSpPr/>
+          <p:nvPr/>
+        </p:nvSpPr>
+        <p:spPr>
+          <a:xfrm>
+            <a:off x="838201" y="5410200"/>
+            <a:ext cx="152400" cy="76200"/>
+          </a:xfrm>
+          <a:prstGeom prst="rect">
+            <a:avLst/>
+          </a:prstGeom>
+          <a:noFill/>
+          <a:ln>
+            <a:noFill/>
+          </a:ln>
+        </p:spPr>
+        <p:style>
+          <a:lnRef idx="2">
+            <a:schemeClr val="accent1">
+              <a:shade val="50000"/>
+            </a:schemeClr>
+          </a:lnRef>
+          <a:fillRef idx="1">
+            <a:schemeClr val="accent1"/>
+          </a:fillRef>
+          <a:effectRef idx="0">
+            <a:schemeClr val="accent1"/>
+          </a:effectRef>
+          <a:fontRef idx="minor">
+            <a:schemeClr val="lt1"/>
+          </a:fontRef>
+        </p:style>
+        <p:txBody>
+          <a:bodyPr wrap="none" lIns="45720" rIns="45720" rtlCol="0" anchor="ctr"/>
+          <a:lstStyle/>
+          <a:p>
+            <a:pPr algn="ctr"/>
+            <a:r>
+              <a:rPr lang="en-US" sz="900" dirty="0">
+                <a:solidFill>
+                  <a:srgbClr val="000000"/>
+                </a:solidFill>
+                <a:latin typeface="Courier New" panose="02070309020205020404" pitchFamily="49" charset="0"/>
+                <a:cs typeface="Courier New" panose="02070309020205020404" pitchFamily="49" charset="0"/>
+              </a:rPr>
+              <a:t>1</a:t>
+            </a:r>
+            <a:endParaRPr lang="en-US" sz="900" dirty="0">
+              <a:solidFill>
+                <a:srgbClr val="000000"/>
+              </a:solidFill>
+              <a:latin typeface="Courier New" panose="02070309020205020404" pitchFamily="49" charset="0"/>
+              <a:cs typeface="Courier New" panose="02070309020205020404" pitchFamily="49" charset="0"/>
+            </a:endParaRPr>
+          </a:p>
+        </p:txBody>
+      </p:sp>
+      <p:sp>
+        <p:nvSpPr>
+          <p:cNvPr id="454" name="Pentagon 453"/>
+          <p:cNvSpPr/>
+          <p:nvPr/>
+        </p:nvSpPr>
+        <p:spPr>
+          <a:xfrm>
+            <a:off x="533400" y="5486400"/>
+            <a:ext cx="228600" cy="152400"/>
+          </a:xfrm>
+          <a:prstGeom prst="homePlate">
+            <a:avLst/>
+          </a:prstGeom>
+          <a:noFill/>
+          <a:ln w="12700">
+            <a:solidFill>
+              <a:schemeClr val="tx1"/>
+            </a:solidFill>
+          </a:ln>
+        </p:spPr>
+        <p:style>
+          <a:lnRef idx="2">
+            <a:schemeClr val="accent1">
+              <a:shade val="50000"/>
+            </a:schemeClr>
+          </a:lnRef>
+          <a:fillRef idx="1">
+            <a:schemeClr val="accent1"/>
+          </a:fillRef>
+          <a:effectRef idx="0">
+            <a:schemeClr val="accent1"/>
+          </a:effectRef>
+          <a:fontRef idx="minor">
+            <a:schemeClr val="lt1"/>
+          </a:fontRef>
+        </p:style>
+        <p:txBody>
+          <a:bodyPr rot="0" spcFirstLastPara="0" vertOverflow="overflow" horzOverflow="overflow" vert="horz" wrap="square" lIns="91440" tIns="45720" rIns="91440" bIns="45720" numCol="1" spcCol="0" rtlCol="0" fromWordArt="0" anchor="ctr" anchorCtr="0" forceAA="0" compatLnSpc="1">
+            <a:prstTxWarp prst="textNoShape">
+              <a:avLst/>
+            </a:prstTxWarp>
+            <a:noAutofit/>
+          </a:bodyPr>
+          <a:lstStyle/>
+          <a:p>
+            <a:pPr algn="ctr"/>
+            <a:endParaRPr lang="en-US" sz="3730"/>
+          </a:p>
+        </p:txBody>
+      </p:sp>
+      <p:cxnSp>
+        <p:nvCxnSpPr>
+          <p:cNvPr id="455" name="Straight Connector 454"/>
+          <p:cNvCxnSpPr>
+            <a:stCxn id="454" idx="3"/>
+          </p:cNvCxnSpPr>
+          <p:nvPr/>
+        </p:nvCxnSpPr>
+        <p:spPr>
+          <a:xfrm>
+            <a:off x="762000" y="5562600"/>
+            <a:ext cx="19812000" cy="0"/>
+          </a:xfrm>
+          <a:prstGeom prst="line">
+            <a:avLst/>
+          </a:prstGeom>
+          <a:ln w="12700">
+            <a:solidFill>
+              <a:srgbClr val="000000"/>
+            </a:solidFill>
+            <a:headEnd type="none" w="med" len="med"/>
+            <a:tailEnd type="none" w="med" len="med"/>
+          </a:ln>
+        </p:spPr>
+        <p:style>
+          <a:lnRef idx="1">
+            <a:schemeClr val="accent1"/>
+          </a:lnRef>
+          <a:fillRef idx="0">
+            <a:schemeClr val="accent1"/>
+          </a:fillRef>
+          <a:effectRef idx="0">
+            <a:schemeClr val="accent1"/>
+          </a:effectRef>
+          <a:fontRef idx="minor">
+            <a:schemeClr val="tx1"/>
+          </a:fontRef>
+        </p:style>
+      </p:cxnSp>
+      <p:sp>
+        <p:nvSpPr>
+          <p:cNvPr id="456" name="Trapezoid 455"/>
+          <p:cNvSpPr/>
+          <p:nvPr/>
+        </p:nvSpPr>
+        <p:spPr>
+          <a:xfrm rot="5400000">
+            <a:off x="20345400" y="8001000"/>
+            <a:ext cx="457200" cy="152400"/>
+          </a:xfrm>
+          <a:prstGeom prst="trapezoid">
+            <a:avLst>
+              <a:gd name="adj" fmla="val 110715"/>
+            </a:avLst>
+          </a:prstGeom>
+          <a:noFill/>
+          <a:ln w="12700">
+            <a:solidFill>
+              <a:srgbClr val="000000"/>
+            </a:solidFill>
+          </a:ln>
+        </p:spPr>
+        <p:style>
+          <a:lnRef idx="2">
+            <a:schemeClr val="accent1">
+              <a:shade val="50000"/>
+            </a:schemeClr>
+          </a:lnRef>
+          <a:fillRef idx="1">
+            <a:schemeClr val="accent1"/>
+          </a:fillRef>
+          <a:effectRef idx="0">
+            <a:schemeClr val="accent1"/>
+          </a:effectRef>
+          <a:fontRef idx="minor">
+            <a:schemeClr val="lt1"/>
+          </a:fontRef>
+        </p:style>
+        <p:txBody>
+          <a:bodyPr rtlCol="0" anchor="ctr"/>
+          <a:lstStyle/>
+          <a:p>
+            <a:pPr algn="ctr"/>
+            <a:endParaRPr lang="en-US" sz="3730"/>
+          </a:p>
+        </p:txBody>
+      </p:sp>
+      <p:sp>
+        <p:nvSpPr>
+          <p:cNvPr id="457" name="Rectangle 456"/>
+          <p:cNvSpPr/>
+          <p:nvPr/>
+        </p:nvSpPr>
+        <p:spPr>
+          <a:xfrm>
+            <a:off x="20497800" y="8077200"/>
+            <a:ext cx="152400" cy="152400"/>
+          </a:xfrm>
+          <a:prstGeom prst="rect">
+            <a:avLst/>
+          </a:prstGeom>
+          <a:noFill/>
+          <a:ln>
+            <a:noFill/>
+          </a:ln>
+        </p:spPr>
+        <p:style>
+          <a:lnRef idx="2">
+            <a:schemeClr val="accent1">
+              <a:shade val="50000"/>
+            </a:schemeClr>
+          </a:lnRef>
+          <a:fillRef idx="1">
+            <a:schemeClr val="accent1"/>
+          </a:fillRef>
+          <a:effectRef idx="0">
+            <a:schemeClr val="accent1"/>
+          </a:effectRef>
+          <a:fontRef idx="minor">
+            <a:schemeClr val="lt1"/>
+          </a:fontRef>
+        </p:style>
+        <p:txBody>
+          <a:bodyPr wrap="none" lIns="45720" rIns="45720" rtlCol="0" anchor="ctr"/>
+          <a:lstStyle/>
+          <a:p>
+            <a:pPr algn="ctr"/>
+            <a:r>
+              <a:rPr lang="en-US" sz="900" dirty="0">
+                <a:solidFill>
+                  <a:srgbClr val="000000"/>
+                </a:solidFill>
+                <a:latin typeface="Courier New" panose="02070309020205020404" pitchFamily="49" charset="0"/>
+                <a:cs typeface="Courier New" panose="02070309020205020404" pitchFamily="49" charset="0"/>
+              </a:rPr>
+              <a:t>0</a:t>
+            </a:r>
+            <a:endParaRPr lang="en-US" sz="900" dirty="0">
+              <a:solidFill>
+                <a:srgbClr val="000000"/>
+              </a:solidFill>
+              <a:latin typeface="Courier New" panose="02070309020205020404" pitchFamily="49" charset="0"/>
+              <a:cs typeface="Courier New" panose="02070309020205020404" pitchFamily="49" charset="0"/>
+            </a:endParaRPr>
+          </a:p>
+        </p:txBody>
+      </p:sp>
+      <p:sp>
+        <p:nvSpPr>
+          <p:cNvPr id="458" name="Rectangle 457"/>
+          <p:cNvSpPr/>
+          <p:nvPr/>
+        </p:nvSpPr>
+        <p:spPr>
+          <a:xfrm>
+            <a:off x="20497800" y="7924800"/>
+            <a:ext cx="152400" cy="152400"/>
+          </a:xfrm>
+          <a:prstGeom prst="rect">
+            <a:avLst/>
+          </a:prstGeom>
+          <a:noFill/>
+          <a:ln>
+            <a:noFill/>
+          </a:ln>
+        </p:spPr>
+        <p:style>
+          <a:lnRef idx="2">
+            <a:schemeClr val="accent1">
+              <a:shade val="50000"/>
+            </a:schemeClr>
+          </a:lnRef>
+          <a:fillRef idx="1">
+            <a:schemeClr val="accent1"/>
+          </a:fillRef>
+          <a:effectRef idx="0">
+            <a:schemeClr val="accent1"/>
+          </a:effectRef>
+          <a:fontRef idx="minor">
+            <a:schemeClr val="lt1"/>
+          </a:fontRef>
+        </p:style>
+        <p:txBody>
+          <a:bodyPr wrap="none" lIns="45720" rIns="45720" rtlCol="0" anchor="ctr"/>
+          <a:lstStyle/>
+          <a:p>
+            <a:pPr algn="ctr"/>
+            <a:r>
+              <a:rPr lang="en-US" sz="900" dirty="0">
+                <a:solidFill>
+                  <a:srgbClr val="000000"/>
+                </a:solidFill>
+                <a:latin typeface="Courier New" panose="02070309020205020404" pitchFamily="49" charset="0"/>
+                <a:cs typeface="Courier New" panose="02070309020205020404" pitchFamily="49" charset="0"/>
+              </a:rPr>
+              <a:t>1</a:t>
+            </a:r>
+            <a:endParaRPr lang="en-US" sz="900" dirty="0">
+              <a:solidFill>
+                <a:srgbClr val="000000"/>
+              </a:solidFill>
+              <a:latin typeface="Courier New" panose="02070309020205020404" pitchFamily="49" charset="0"/>
+              <a:cs typeface="Courier New" panose="02070309020205020404" pitchFamily="49" charset="0"/>
+            </a:endParaRPr>
+          </a:p>
+        </p:txBody>
+      </p:sp>
+      <p:cxnSp>
+        <p:nvCxnSpPr>
+          <p:cNvPr id="459" name="Straight Connector 458"/>
+          <p:cNvCxnSpPr>
+            <a:stCxn id="205" idx="3"/>
+          </p:cNvCxnSpPr>
+          <p:nvPr/>
+        </p:nvCxnSpPr>
+        <p:spPr>
+          <a:xfrm>
+            <a:off x="19431000" y="8229600"/>
+            <a:ext cx="1066800" cy="0"/>
+          </a:xfrm>
+          <a:prstGeom prst="line">
+            <a:avLst/>
+          </a:prstGeom>
+          <a:ln w="12700">
+            <a:solidFill>
+              <a:srgbClr val="000000"/>
+            </a:solidFill>
+            <a:headEnd type="none" w="med" len="med"/>
+            <a:tailEnd type="none" w="med" len="med"/>
+          </a:ln>
+        </p:spPr>
+        <p:style>
+          <a:lnRef idx="1">
+            <a:schemeClr val="accent1"/>
+          </a:lnRef>
+          <a:fillRef idx="0">
+            <a:schemeClr val="accent1"/>
+          </a:fillRef>
+          <a:effectRef idx="0">
+            <a:schemeClr val="accent1"/>
+          </a:effectRef>
+          <a:fontRef idx="minor">
+            <a:schemeClr val="tx1"/>
+          </a:fontRef>
+        </p:style>
+      </p:cxnSp>
+      <p:cxnSp>
+        <p:nvCxnSpPr>
+          <p:cNvPr id="461" name="Straight Connector 460"/>
+          <p:cNvCxnSpPr/>
+          <p:nvPr/>
+        </p:nvCxnSpPr>
+        <p:spPr>
+          <a:xfrm>
+            <a:off x="20574000" y="5562600"/>
+            <a:ext cx="0" cy="2362200"/>
+          </a:xfrm>
+          <a:prstGeom prst="line">
+            <a:avLst/>
+          </a:prstGeom>
+          <a:ln w="12700">
+            <a:solidFill>
+              <a:srgbClr val="000000"/>
+            </a:solidFill>
+            <a:headEnd type="none" w="med" len="med"/>
+            <a:tailEnd type="none" w="med" len="med"/>
+          </a:ln>
+        </p:spPr>
+        <p:style>
+          <a:lnRef idx="1">
+            <a:schemeClr val="accent1"/>
+          </a:lnRef>
+          <a:fillRef idx="0">
+            <a:schemeClr val="accent1"/>
+          </a:fillRef>
+          <a:effectRef idx="0">
+            <a:schemeClr val="accent1"/>
+          </a:effectRef>
+          <a:fontRef idx="minor">
+            <a:schemeClr val="tx1"/>
+          </a:fontRef>
+        </p:style>
+      </p:cxnSp>
+      <p:sp>
+        <p:nvSpPr>
+          <p:cNvPr id="462" name="Oval 461"/>
+          <p:cNvSpPr/>
+          <p:nvPr/>
+        </p:nvSpPr>
+        <p:spPr>
+          <a:xfrm>
+            <a:off x="20345400" y="7848600"/>
+            <a:ext cx="152400" cy="152400"/>
+          </a:xfrm>
+          <a:prstGeom prst="ellipse">
+            <a:avLst/>
+          </a:prstGeom>
+          <a:noFill/>
+          <a:ln>
+            <a:solidFill>
+              <a:schemeClr val="tx1"/>
+            </a:solidFill>
+          </a:ln>
+        </p:spPr>
+        <p:style>
+          <a:lnRef idx="2">
+            <a:schemeClr val="accent1">
+              <a:shade val="50000"/>
+            </a:schemeClr>
+          </a:lnRef>
+          <a:fillRef idx="1">
+            <a:schemeClr val="accent1"/>
+          </a:fillRef>
+          <a:effectRef idx="0">
+            <a:schemeClr val="accent1"/>
+          </a:effectRef>
+          <a:fontRef idx="minor">
+            <a:schemeClr val="lt1"/>
+          </a:fontRef>
+        </p:style>
+        <p:txBody>
+          <a:bodyPr rtlCol="0" anchor="ctr"/>
+          <a:lstStyle/>
+          <a:p>
+            <a:pPr algn="ctr"/>
+            <a:endParaRPr lang="en-US"/>
+          </a:p>
+        </p:txBody>
+      </p:sp>
+      <p:cxnSp>
+        <p:nvCxnSpPr>
+          <p:cNvPr id="463" name="Straight Connector 462"/>
+          <p:cNvCxnSpPr/>
+          <p:nvPr/>
+        </p:nvCxnSpPr>
+        <p:spPr>
+          <a:xfrm>
+            <a:off x="19812000" y="7924800"/>
+            <a:ext cx="533400" cy="0"/>
+          </a:xfrm>
+          <a:prstGeom prst="line">
+            <a:avLst/>
+          </a:prstGeom>
+          <a:ln w="12700">
+            <a:solidFill>
+              <a:srgbClr val="000000"/>
+            </a:solidFill>
+            <a:headEnd type="none" w="med" len="med"/>
+            <a:tailEnd type="none" w="med" len="med"/>
+          </a:ln>
+        </p:spPr>
+        <p:style>
+          <a:lnRef idx="1">
+            <a:schemeClr val="accent1"/>
+          </a:lnRef>
+          <a:fillRef idx="0">
+            <a:schemeClr val="accent1"/>
+          </a:fillRef>
+          <a:effectRef idx="0">
+            <a:schemeClr val="accent1"/>
+          </a:effectRef>
+          <a:fontRef idx="minor">
+            <a:schemeClr val="tx1"/>
+          </a:fontRef>
+        </p:style>
+      </p:cxnSp>
+      <p:cxnSp>
+        <p:nvCxnSpPr>
+          <p:cNvPr id="464" name="Straight Connector 463"/>
+          <p:cNvCxnSpPr/>
+          <p:nvPr/>
+        </p:nvCxnSpPr>
+        <p:spPr>
+          <a:xfrm flipV="1">
+            <a:off x="19812000" y="7924800"/>
+            <a:ext cx="0" cy="304800"/>
+          </a:xfrm>
+          <a:prstGeom prst="line">
+            <a:avLst/>
+          </a:prstGeom>
+          <a:ln w="12700">
+            <a:solidFill>
+              <a:srgbClr val="000000"/>
+            </a:solidFill>
+            <a:headEnd type="oval" w="med" len="med"/>
+            <a:tailEnd type="none" w="med" len="med"/>
+          </a:ln>
+        </p:spPr>
+        <p:style>
+          <a:lnRef idx="1">
+            <a:schemeClr val="accent1"/>
+          </a:lnRef>
+          <a:fillRef idx="0">
+            <a:schemeClr val="accent1"/>
+          </a:fillRef>
+          <a:effectRef idx="0">
+            <a:schemeClr val="accent1"/>
+          </a:effectRef>
+          <a:fontRef idx="minor">
+            <a:schemeClr val="tx1"/>
+          </a:fontRef>
+        </p:style>
+      </p:cxnSp>
     </p:spTree>
     <p:extLst>
       <p:ext uri="{BB962C8B-B14F-4D97-AF65-F5344CB8AC3E}">

</xml_diff>